<commit_message>
presentation + debut photo pour gif
</commit_message>
<xml_diff>
--- a/Documents/Présentation ExtremRoguelike.pptx
+++ b/Documents/Présentation ExtremRoguelike.pptx
@@ -13,9 +13,19 @@
     <p:sldId id="261" r:id="rId7"/>
     <p:sldId id="262" r:id="rId8"/>
     <p:sldId id="264" r:id="rId9"/>
-    <p:sldId id="263" r:id="rId10"/>
-    <p:sldId id="265" r:id="rId11"/>
-    <p:sldId id="266" r:id="rId12"/>
+    <p:sldId id="276" r:id="rId10"/>
+    <p:sldId id="267" r:id="rId11"/>
+    <p:sldId id="272" r:id="rId12"/>
+    <p:sldId id="268" r:id="rId13"/>
+    <p:sldId id="273" r:id="rId14"/>
+    <p:sldId id="269" r:id="rId15"/>
+    <p:sldId id="274" r:id="rId16"/>
+    <p:sldId id="270" r:id="rId17"/>
+    <p:sldId id="275" r:id="rId18"/>
+    <p:sldId id="271" r:id="rId19"/>
+    <p:sldId id="263" r:id="rId20"/>
+    <p:sldId id="265" r:id="rId21"/>
+    <p:sldId id="266" r:id="rId22"/>
   </p:sldIdLst>
   <p:sldSz cx="12192000" cy="6858000"/>
   <p:notesSz cx="6858000" cy="9144000"/>
@@ -114,6 +124,11 @@
       </a:defRPr>
     </a:lvl9pPr>
   </p:defaultTextStyle>
+  <p:extLst>
+    <p:ext uri="{EFAFB233-063F-42B5-8137-9DF3F51BA10A}">
+      <p15:sldGuideLst xmlns:p15="http://schemas.microsoft.com/office/powerpoint/2012/main"/>
+    </p:ext>
+  </p:extLst>
 </p:presentation>
 </file>
 
@@ -302,7 +317,7 @@
           <a:p>
             <a:fld id="{CF7E704A-4A5B-4083-AE50-BEC8DD5FB5E2}" type="datetimeFigureOut">
               <a:rPr lang="fr-FR" smtClean="0"/>
-              <a:t>02/01/2017</a:t>
+              <a:t>03/01/2017</a:t>
             </a:fld>
             <a:endParaRPr lang="fr-FR"/>
           </a:p>
@@ -600,7 +615,7 @@
           <a:p>
             <a:fld id="{CF7E704A-4A5B-4083-AE50-BEC8DD5FB5E2}" type="datetimeFigureOut">
               <a:rPr lang="fr-FR" smtClean="0"/>
-              <a:t>02/01/2017</a:t>
+              <a:t>03/01/2017</a:t>
             </a:fld>
             <a:endParaRPr lang="fr-FR"/>
           </a:p>
@@ -792,7 +807,7 @@
           <a:p>
             <a:fld id="{CF7E704A-4A5B-4083-AE50-BEC8DD5FB5E2}" type="datetimeFigureOut">
               <a:rPr lang="fr-FR" smtClean="0"/>
-              <a:t>02/01/2017</a:t>
+              <a:t>03/01/2017</a:t>
             </a:fld>
             <a:endParaRPr lang="fr-FR"/>
           </a:p>
@@ -1053,7 +1068,7 @@
           <a:p>
             <a:fld id="{CF7E704A-4A5B-4083-AE50-BEC8DD5FB5E2}" type="datetimeFigureOut">
               <a:rPr lang="fr-FR" smtClean="0"/>
-              <a:t>02/01/2017</a:t>
+              <a:t>03/01/2017</a:t>
             </a:fld>
             <a:endParaRPr lang="fr-FR"/>
           </a:p>
@@ -1477,7 +1492,7 @@
           <a:p>
             <a:fld id="{CF7E704A-4A5B-4083-AE50-BEC8DD5FB5E2}" type="datetimeFigureOut">
               <a:rPr lang="fr-FR" smtClean="0"/>
-              <a:t>02/01/2017</a:t>
+              <a:t>03/01/2017</a:t>
             </a:fld>
             <a:endParaRPr lang="fr-FR"/>
           </a:p>
@@ -2014,7 +2029,7 @@
           <a:p>
             <a:fld id="{CF7E704A-4A5B-4083-AE50-BEC8DD5FB5E2}" type="datetimeFigureOut">
               <a:rPr lang="fr-FR" smtClean="0"/>
-              <a:t>02/01/2017</a:t>
+              <a:t>03/01/2017</a:t>
             </a:fld>
             <a:endParaRPr lang="fr-FR"/>
           </a:p>
@@ -2878,7 +2893,7 @@
           <a:p>
             <a:fld id="{CF7E704A-4A5B-4083-AE50-BEC8DD5FB5E2}" type="datetimeFigureOut">
               <a:rPr lang="fr-FR" smtClean="0"/>
-              <a:t>02/01/2017</a:t>
+              <a:t>03/01/2017</a:t>
             </a:fld>
             <a:endParaRPr lang="fr-FR"/>
           </a:p>
@@ -3048,7 +3063,7 @@
           <a:p>
             <a:fld id="{CF7E704A-4A5B-4083-AE50-BEC8DD5FB5E2}" type="datetimeFigureOut">
               <a:rPr lang="fr-FR" smtClean="0"/>
-              <a:t>02/01/2017</a:t>
+              <a:t>03/01/2017</a:t>
             </a:fld>
             <a:endParaRPr lang="fr-FR"/>
           </a:p>
@@ -3232,7 +3247,7 @@
           <a:p>
             <a:fld id="{CF7E704A-4A5B-4083-AE50-BEC8DD5FB5E2}" type="datetimeFigureOut">
               <a:rPr lang="fr-FR" smtClean="0"/>
-              <a:t>02/01/2017</a:t>
+              <a:t>03/01/2017</a:t>
             </a:fld>
             <a:endParaRPr lang="fr-FR"/>
           </a:p>
@@ -3402,7 +3417,7 @@
           <a:p>
             <a:fld id="{CF7E704A-4A5B-4083-AE50-BEC8DD5FB5E2}" type="datetimeFigureOut">
               <a:rPr lang="fr-FR" smtClean="0"/>
-              <a:t>02/01/2017</a:t>
+              <a:t>03/01/2017</a:t>
             </a:fld>
             <a:endParaRPr lang="fr-FR"/>
           </a:p>
@@ -3646,7 +3661,7 @@
           <a:p>
             <a:fld id="{CF7E704A-4A5B-4083-AE50-BEC8DD5FB5E2}" type="datetimeFigureOut">
               <a:rPr lang="fr-FR" smtClean="0"/>
-              <a:t>02/01/2017</a:t>
+              <a:t>03/01/2017</a:t>
             </a:fld>
             <a:endParaRPr lang="fr-FR"/>
           </a:p>
@@ -3882,7 +3897,7 @@
           <a:p>
             <a:fld id="{CF7E704A-4A5B-4083-AE50-BEC8DD5FB5E2}" type="datetimeFigureOut">
               <a:rPr lang="fr-FR" smtClean="0"/>
-              <a:t>02/01/2017</a:t>
+              <a:t>03/01/2017</a:t>
             </a:fld>
             <a:endParaRPr lang="fr-FR"/>
           </a:p>
@@ -4348,7 +4363,7 @@
           <a:p>
             <a:fld id="{CF7E704A-4A5B-4083-AE50-BEC8DD5FB5E2}" type="datetimeFigureOut">
               <a:rPr lang="fr-FR" smtClean="0"/>
-              <a:t>02/01/2017</a:t>
+              <a:t>03/01/2017</a:t>
             </a:fld>
             <a:endParaRPr lang="fr-FR"/>
           </a:p>
@@ -4466,7 +4481,7 @@
           <a:p>
             <a:fld id="{CF7E704A-4A5B-4083-AE50-BEC8DD5FB5E2}" type="datetimeFigureOut">
               <a:rPr lang="fr-FR" smtClean="0"/>
-              <a:t>02/01/2017</a:t>
+              <a:t>03/01/2017</a:t>
             </a:fld>
             <a:endParaRPr lang="fr-FR"/>
           </a:p>
@@ -4561,7 +4576,7 @@
           <a:p>
             <a:fld id="{CF7E704A-4A5B-4083-AE50-BEC8DD5FB5E2}" type="datetimeFigureOut">
               <a:rPr lang="fr-FR" smtClean="0"/>
-              <a:t>02/01/2017</a:t>
+              <a:t>03/01/2017</a:t>
             </a:fld>
             <a:endParaRPr lang="fr-FR"/>
           </a:p>
@@ -4816,7 +4831,7 @@
           <a:p>
             <a:fld id="{CF7E704A-4A5B-4083-AE50-BEC8DD5FB5E2}" type="datetimeFigureOut">
               <a:rPr lang="fr-FR" smtClean="0"/>
-              <a:t>02/01/2017</a:t>
+              <a:t>03/01/2017</a:t>
             </a:fld>
             <a:endParaRPr lang="fr-FR"/>
           </a:p>
@@ -5116,7 +5131,7 @@
           <a:p>
             <a:fld id="{CF7E704A-4A5B-4083-AE50-BEC8DD5FB5E2}" type="datetimeFigureOut">
               <a:rPr lang="fr-FR" smtClean="0"/>
-              <a:t>02/01/2017</a:t>
+              <a:t>03/01/2017</a:t>
             </a:fld>
             <a:endParaRPr lang="fr-FR"/>
           </a:p>
@@ -5350,7 +5365,7 @@
           <a:p>
             <a:fld id="{CF7E704A-4A5B-4083-AE50-BEC8DD5FB5E2}" type="datetimeFigureOut">
               <a:rPr lang="fr-FR" smtClean="0"/>
-              <a:t>02/01/2017</a:t>
+              <a:t>03/01/2017</a:t>
             </a:fld>
             <a:endParaRPr lang="fr-FR"/>
           </a:p>
@@ -6243,8 +6258,8 @@
         </p:nvSpPr>
         <p:spPr>
           <a:xfrm>
-            <a:off x="0" y="165723"/>
-            <a:ext cx="5900974" cy="707886"/>
+            <a:off x="-41293" y="121741"/>
+            <a:ext cx="5511445" cy="707886"/>
           </a:xfrm>
           <a:prstGeom prst="rect">
             <a:avLst/>
@@ -6259,7 +6274,7 @@
           <a:p>
             <a:pPr algn="ctr"/>
             <a:r>
-              <a:rPr lang="fr-FR" sz="4000" b="1" cap="none" spc="0" dirty="0">
+              <a:rPr lang="fr-FR" sz="4000" b="1" dirty="0">
                 <a:ln w="13462">
                   <a:solidFill>
                     <a:schemeClr val="bg1"/>
@@ -6279,15 +6294,88 @@
                 </a:effectLst>
                 <a:latin typeface="Bauhaus 93" panose="04030905020B02020C02" pitchFamily="82" charset="0"/>
               </a:rPr>
-              <a:t>Problème / Amélioration</a:t>
-            </a:r>
-          </a:p>
-        </p:txBody>
-      </p:sp>
+              <a:t>Conception - Affichage</a:t>
+            </a:r>
+          </a:p>
+        </p:txBody>
+      </p:sp>
+      <p:pic>
+        <p:nvPicPr>
+          <p:cNvPr id="5" name="Image 4"/>
+          <p:cNvPicPr>
+            <a:picLocks noChangeAspect="1"/>
+          </p:cNvPicPr>
+          <p:nvPr/>
+        </p:nvPicPr>
+        <p:blipFill>
+          <a:blip r:embed="rId2">
+            <a:extLst>
+              <a:ext uri="{28A0092B-C50C-407E-A947-70E740481C1C}">
+                <a14:useLocalDpi xmlns:a14="http://schemas.microsoft.com/office/drawing/2010/main" val="0"/>
+              </a:ext>
+            </a:extLst>
+          </a:blip>
+          <a:stretch>
+            <a:fillRect/>
+          </a:stretch>
+        </p:blipFill>
+        <p:spPr>
+          <a:xfrm>
+            <a:off x="3851822" y="1163835"/>
+            <a:ext cx="4176442" cy="1231301"/>
+          </a:xfrm>
+          <a:prstGeom prst="roundRect">
+            <a:avLst>
+              <a:gd name="adj" fmla="val 8594"/>
+            </a:avLst>
+          </a:prstGeom>
+          <a:solidFill>
+            <a:srgbClr val="FFFFFF">
+              <a:shade val="85000"/>
+            </a:srgbClr>
+          </a:solidFill>
+          <a:ln>
+            <a:noFill/>
+          </a:ln>
+          <a:effectLst>
+            <a:reflection blurRad="12700" stA="38000" endPos="28000" dist="5000" dir="5400000" sy="-100000" algn="bl" rotWithShape="0"/>
+          </a:effectLst>
+        </p:spPr>
+      </p:pic>
+      <p:pic>
+        <p:nvPicPr>
+          <p:cNvPr id="6" name="Image 5"/>
+          <p:cNvPicPr>
+            <a:picLocks noChangeAspect="1"/>
+          </p:cNvPicPr>
+          <p:nvPr/>
+        </p:nvPicPr>
+        <p:blipFill>
+          <a:blip r:embed="rId3">
+            <a:extLst>
+              <a:ext uri="{28A0092B-C50C-407E-A947-70E740481C1C}">
+                <a14:useLocalDpi xmlns:a14="http://schemas.microsoft.com/office/drawing/2010/main" val="0"/>
+              </a:ext>
+            </a:extLst>
+          </a:blip>
+          <a:stretch>
+            <a:fillRect/>
+          </a:stretch>
+        </p:blipFill>
+        <p:spPr>
+          <a:xfrm>
+            <a:off x="361426" y="1779485"/>
+            <a:ext cx="2353003" cy="4725059"/>
+          </a:xfrm>
+          <a:prstGeom prst="rect">
+            <a:avLst/>
+          </a:prstGeom>
+        </p:spPr>
+      </p:pic>
     </p:spTree>
     <p:extLst>
       <p:ext uri="{BB962C8B-B14F-4D97-AF65-F5344CB8AC3E}">
-        <p14:creationId xmlns:p14="http://schemas.microsoft.com/office/powerpoint/2010/main" val="2803989285"/>
+        <p14:creationId xmlns:p14="http://schemas.microsoft.com/office/powerpoint/2010/main" val="118554246"/>
       </p:ext>
     </p:extLst>
   </p:cSld>
@@ -6322,8 +6410,8 @@
         </p:nvSpPr>
         <p:spPr>
           <a:xfrm>
-            <a:off x="72112" y="61920"/>
-            <a:ext cx="4504759" cy="707886"/>
+            <a:off x="-41293" y="121741"/>
+            <a:ext cx="5511445" cy="707886"/>
           </a:xfrm>
           <a:prstGeom prst="rect">
             <a:avLst/>
@@ -6338,7 +6426,7 @@
           <a:p>
             <a:pPr algn="ctr"/>
             <a:r>
-              <a:rPr lang="fr-FR" sz="4000" b="1" cap="none" spc="0" dirty="0">
+              <a:rPr lang="fr-FR" sz="4000" b="1" dirty="0">
                 <a:ln w="13462">
                   <a:solidFill>
                     <a:schemeClr val="bg1"/>
@@ -6358,15 +6446,1591 @@
                 </a:effectLst>
                 <a:latin typeface="Bauhaus 93" panose="04030905020B02020C02" pitchFamily="82" charset="0"/>
               </a:rPr>
-              <a:t>Bilan / Conclusion</a:t>
-            </a:r>
+              <a:t>Conception - Affichage</a:t>
+            </a:r>
+          </a:p>
+        </p:txBody>
+      </p:sp>
+      <p:pic>
+        <p:nvPicPr>
+          <p:cNvPr id="2" name="Image 1"/>
+          <p:cNvPicPr>
+            <a:picLocks noChangeAspect="1"/>
+          </p:cNvPicPr>
+          <p:nvPr/>
+        </p:nvPicPr>
+        <p:blipFill>
+          <a:blip r:embed="rId2">
+            <a:extLst>
+              <a:ext uri="{28A0092B-C50C-407E-A947-70E740481C1C}">
+                <a14:useLocalDpi xmlns:a14="http://schemas.microsoft.com/office/drawing/2010/main" val="0"/>
+              </a:ext>
+            </a:extLst>
+          </a:blip>
+          <a:stretch>
+            <a:fillRect/>
+          </a:stretch>
+        </p:blipFill>
+        <p:spPr>
+          <a:xfrm>
+            <a:off x="325440" y="1031845"/>
+            <a:ext cx="5639132" cy="2769265"/>
+          </a:xfrm>
+          <a:prstGeom prst="rect">
+            <a:avLst/>
+          </a:prstGeom>
+          <a:ln w="38100" cap="sq">
+            <a:solidFill>
+              <a:srgbClr val="000000"/>
+            </a:solidFill>
+            <a:prstDash val="solid"/>
+            <a:miter lim="800000"/>
+          </a:ln>
+          <a:effectLst>
+            <a:outerShdw blurRad="50800" dist="38100" dir="2700000" algn="tl" rotWithShape="0">
+              <a:srgbClr val="000000">
+                <a:alpha val="43000"/>
+              </a:srgbClr>
+            </a:outerShdw>
+          </a:effectLst>
+        </p:spPr>
+      </p:pic>
+      <p:pic>
+        <p:nvPicPr>
+          <p:cNvPr id="3" name="Image 2"/>
+          <p:cNvPicPr>
+            <a:picLocks noChangeAspect="1"/>
+          </p:cNvPicPr>
+          <p:nvPr/>
+        </p:nvPicPr>
+        <p:blipFill>
+          <a:blip r:embed="rId3">
+            <a:extLst>
+              <a:ext uri="{28A0092B-C50C-407E-A947-70E740481C1C}">
+                <a14:useLocalDpi xmlns:a14="http://schemas.microsoft.com/office/drawing/2010/main" val="0"/>
+              </a:ext>
+            </a:extLst>
+          </a:blip>
+          <a:stretch>
+            <a:fillRect/>
+          </a:stretch>
+        </p:blipFill>
+        <p:spPr>
+          <a:xfrm>
+            <a:off x="6290013" y="3801110"/>
+            <a:ext cx="5639500" cy="2769265"/>
+          </a:xfrm>
+          <a:prstGeom prst="rect">
+            <a:avLst/>
+          </a:prstGeom>
+          <a:ln w="38100" cap="sq">
+            <a:solidFill>
+              <a:srgbClr val="000000"/>
+            </a:solidFill>
+            <a:prstDash val="solid"/>
+            <a:miter lim="800000"/>
+          </a:ln>
+          <a:effectLst>
+            <a:outerShdw blurRad="50800" dist="38100" dir="2700000" algn="tl" rotWithShape="0">
+              <a:srgbClr val="000000">
+                <a:alpha val="43000"/>
+              </a:srgbClr>
+            </a:outerShdw>
+          </a:effectLst>
+        </p:spPr>
+      </p:pic>
+      <p:sp>
+        <p:nvSpPr>
+          <p:cNvPr id="5" name="Rectangle : coins arrondis 4"/>
+          <p:cNvSpPr/>
+          <p:nvPr/>
+        </p:nvSpPr>
+        <p:spPr>
+          <a:xfrm>
+            <a:off x="6350466" y="4572001"/>
+            <a:ext cx="3355596" cy="209724"/>
+          </a:xfrm>
+          <a:prstGeom prst="roundRect">
+            <a:avLst/>
+          </a:prstGeom>
+          <a:noFill/>
+          <a:ln w="38100">
+            <a:solidFill>
+              <a:srgbClr val="FF0000"/>
+            </a:solidFill>
+          </a:ln>
+        </p:spPr>
+        <p:style>
+          <a:lnRef idx="2">
+            <a:schemeClr val="accent1">
+              <a:shade val="50000"/>
+            </a:schemeClr>
+          </a:lnRef>
+          <a:fillRef idx="1">
+            <a:schemeClr val="accent1"/>
+          </a:fillRef>
+          <a:effectRef idx="0">
+            <a:schemeClr val="accent1"/>
+          </a:effectRef>
+          <a:fontRef idx="minor">
+            <a:schemeClr val="lt1"/>
+          </a:fontRef>
+        </p:style>
+        <p:txBody>
+          <a:bodyPr rtlCol="0" anchor="ctr"/>
+          <a:lstStyle/>
+          <a:p>
+            <a:pPr algn="ctr"/>
+            <a:endParaRPr lang="fr-FR"/>
           </a:p>
         </p:txBody>
       </p:sp>
     </p:spTree>
     <p:extLst>
       <p:ext uri="{BB962C8B-B14F-4D97-AF65-F5344CB8AC3E}">
-        <p14:creationId xmlns:p14="http://schemas.microsoft.com/office/powerpoint/2010/main" val="3399395173"/>
+        <p14:creationId xmlns:p14="http://schemas.microsoft.com/office/powerpoint/2010/main" val="1392962223"/>
+      </p:ext>
+    </p:extLst>
+  </p:cSld>
+  <p:clrMapOvr>
+    <a:masterClrMapping/>
+  </p:clrMapOvr>
+</p:sld>
+</file>
+
+<file path=ppt/slides/slide12.xml><?xml version="1.0" encoding="utf-8"?>
+<p:sld xmlns:a="http://schemas.openxmlformats.org/drawingml/2006/main" xmlns:r="http://schemas.openxmlformats.org/officeDocument/2006/relationships" xmlns:p="http://schemas.openxmlformats.org/presentationml/2006/main">
+  <p:cSld>
+    <p:spTree>
+      <p:nvGrpSpPr>
+        <p:cNvPr id="1" name=""/>
+        <p:cNvGrpSpPr/>
+        <p:nvPr/>
+      </p:nvGrpSpPr>
+      <p:grpSpPr>
+        <a:xfrm>
+          <a:off x="0" y="0"/>
+          <a:ext cx="0" cy="0"/>
+          <a:chOff x="0" y="0"/>
+          <a:chExt cx="0" cy="0"/>
+        </a:xfrm>
+      </p:grpSpPr>
+      <p:sp>
+        <p:nvSpPr>
+          <p:cNvPr id="4" name="Rectangle 3"/>
+          <p:cNvSpPr/>
+          <p:nvPr/>
+        </p:nvSpPr>
+        <p:spPr>
+          <a:xfrm>
+            <a:off x="-41293" y="121741"/>
+            <a:ext cx="5511445" cy="707886"/>
+          </a:xfrm>
+          <a:prstGeom prst="rect">
+            <a:avLst/>
+          </a:prstGeom>
+          <a:noFill/>
+        </p:spPr>
+        <p:txBody>
+          <a:bodyPr wrap="none" lIns="91440" tIns="45720" rIns="91440" bIns="45720">
+            <a:spAutoFit/>
+          </a:bodyPr>
+          <a:lstStyle/>
+          <a:p>
+            <a:pPr algn="ctr"/>
+            <a:r>
+              <a:rPr lang="fr-FR" sz="4000" b="1" dirty="0">
+                <a:ln w="13462">
+                  <a:solidFill>
+                    <a:schemeClr val="bg1"/>
+                  </a:solidFill>
+                  <a:prstDash val="solid"/>
+                </a:ln>
+                <a:solidFill>
+                  <a:schemeClr val="tx1">
+                    <a:lumMod val="85000"/>
+                    <a:lumOff val="15000"/>
+                  </a:schemeClr>
+                </a:solidFill>
+                <a:effectLst>
+                  <a:outerShdw dist="38100" dir="2700000" algn="bl" rotWithShape="0">
+                    <a:schemeClr val="accent5"/>
+                  </a:outerShdw>
+                </a:effectLst>
+                <a:latin typeface="Bauhaus 93" panose="04030905020B02020C02" pitchFamily="82" charset="0"/>
+              </a:rPr>
+              <a:t>Conception - Affichage</a:t>
+            </a:r>
+          </a:p>
+        </p:txBody>
+      </p:sp>
+      <p:pic>
+        <p:nvPicPr>
+          <p:cNvPr id="2" name="Image 1"/>
+          <p:cNvPicPr>
+            <a:picLocks noChangeAspect="1"/>
+          </p:cNvPicPr>
+          <p:nvPr/>
+        </p:nvPicPr>
+        <p:blipFill>
+          <a:blip r:embed="rId2">
+            <a:extLst>
+              <a:ext uri="{28A0092B-C50C-407E-A947-70E740481C1C}">
+                <a14:useLocalDpi xmlns:a14="http://schemas.microsoft.com/office/drawing/2010/main" val="0"/>
+              </a:ext>
+            </a:extLst>
+          </a:blip>
+          <a:stretch>
+            <a:fillRect/>
+          </a:stretch>
+        </p:blipFill>
+        <p:spPr>
+          <a:xfrm>
+            <a:off x="3851822" y="1172224"/>
+            <a:ext cx="4176442" cy="1231301"/>
+          </a:xfrm>
+          <a:prstGeom prst="roundRect">
+            <a:avLst>
+              <a:gd name="adj" fmla="val 8594"/>
+            </a:avLst>
+          </a:prstGeom>
+          <a:solidFill>
+            <a:srgbClr val="FFFFFF">
+              <a:shade val="85000"/>
+            </a:srgbClr>
+          </a:solidFill>
+          <a:ln>
+            <a:noFill/>
+          </a:ln>
+          <a:effectLst>
+            <a:reflection blurRad="12700" stA="38000" endPos="28000" dist="5000" dir="5400000" sy="-100000" algn="bl" rotWithShape="0"/>
+          </a:effectLst>
+        </p:spPr>
+      </p:pic>
+      <p:pic>
+        <p:nvPicPr>
+          <p:cNvPr id="3" name="Image 2"/>
+          <p:cNvPicPr>
+            <a:picLocks noChangeAspect="1"/>
+          </p:cNvPicPr>
+          <p:nvPr/>
+        </p:nvPicPr>
+        <p:blipFill>
+          <a:blip r:embed="rId3">
+            <a:extLst>
+              <a:ext uri="{28A0092B-C50C-407E-A947-70E740481C1C}">
+                <a14:useLocalDpi xmlns:a14="http://schemas.microsoft.com/office/drawing/2010/main" val="0"/>
+              </a:ext>
+            </a:extLst>
+          </a:blip>
+          <a:stretch>
+            <a:fillRect/>
+          </a:stretch>
+        </p:blipFill>
+        <p:spPr>
+          <a:xfrm>
+            <a:off x="581397" y="1967718"/>
+            <a:ext cx="2791215" cy="4734586"/>
+          </a:xfrm>
+          <a:prstGeom prst="rect">
+            <a:avLst/>
+          </a:prstGeom>
+          <a:ln w="38100" cap="sq">
+            <a:solidFill>
+              <a:srgbClr val="000000"/>
+            </a:solidFill>
+            <a:prstDash val="solid"/>
+            <a:miter lim="800000"/>
+          </a:ln>
+          <a:effectLst>
+            <a:outerShdw blurRad="50800" dist="38100" dir="2700000" algn="tl" rotWithShape="0">
+              <a:srgbClr val="000000">
+                <a:alpha val="43000"/>
+              </a:srgbClr>
+            </a:outerShdw>
+          </a:effectLst>
+        </p:spPr>
+      </p:pic>
+    </p:spTree>
+    <p:extLst>
+      <p:ext uri="{BB962C8B-B14F-4D97-AF65-F5344CB8AC3E}">
+        <p14:creationId xmlns:p14="http://schemas.microsoft.com/office/powerpoint/2010/main" val="509339277"/>
+      </p:ext>
+    </p:extLst>
+  </p:cSld>
+  <p:clrMapOvr>
+    <a:masterClrMapping/>
+  </p:clrMapOvr>
+</p:sld>
+</file>
+
+<file path=ppt/slides/slide13.xml><?xml version="1.0" encoding="utf-8"?>
+<p:sld xmlns:a="http://schemas.openxmlformats.org/drawingml/2006/main" xmlns:r="http://schemas.openxmlformats.org/officeDocument/2006/relationships" xmlns:p="http://schemas.openxmlformats.org/presentationml/2006/main">
+  <p:cSld>
+    <p:spTree>
+      <p:nvGrpSpPr>
+        <p:cNvPr id="1" name=""/>
+        <p:cNvGrpSpPr/>
+        <p:nvPr/>
+      </p:nvGrpSpPr>
+      <p:grpSpPr>
+        <a:xfrm>
+          <a:off x="0" y="0"/>
+          <a:ext cx="0" cy="0"/>
+          <a:chOff x="0" y="0"/>
+          <a:chExt cx="0" cy="0"/>
+        </a:xfrm>
+      </p:grpSpPr>
+      <p:sp>
+        <p:nvSpPr>
+          <p:cNvPr id="4" name="Rectangle 3"/>
+          <p:cNvSpPr/>
+          <p:nvPr/>
+        </p:nvSpPr>
+        <p:spPr>
+          <a:xfrm>
+            <a:off x="-41293" y="121741"/>
+            <a:ext cx="5511445" cy="707886"/>
+          </a:xfrm>
+          <a:prstGeom prst="rect">
+            <a:avLst/>
+          </a:prstGeom>
+          <a:noFill/>
+        </p:spPr>
+        <p:txBody>
+          <a:bodyPr wrap="none" lIns="91440" tIns="45720" rIns="91440" bIns="45720">
+            <a:spAutoFit/>
+          </a:bodyPr>
+          <a:lstStyle/>
+          <a:p>
+            <a:pPr algn="ctr"/>
+            <a:r>
+              <a:rPr lang="fr-FR" sz="4000" b="1" dirty="0">
+                <a:ln w="13462">
+                  <a:solidFill>
+                    <a:schemeClr val="bg1"/>
+                  </a:solidFill>
+                  <a:prstDash val="solid"/>
+                </a:ln>
+                <a:solidFill>
+                  <a:schemeClr val="tx1">
+                    <a:lumMod val="85000"/>
+                    <a:lumOff val="15000"/>
+                  </a:schemeClr>
+                </a:solidFill>
+                <a:effectLst>
+                  <a:outerShdw dist="38100" dir="2700000" algn="bl" rotWithShape="0">
+                    <a:schemeClr val="accent5"/>
+                  </a:outerShdw>
+                </a:effectLst>
+                <a:latin typeface="Bauhaus 93" panose="04030905020B02020C02" pitchFamily="82" charset="0"/>
+              </a:rPr>
+              <a:t>Conception - Affichage</a:t>
+            </a:r>
+          </a:p>
+        </p:txBody>
+      </p:sp>
+      <p:pic>
+        <p:nvPicPr>
+          <p:cNvPr id="2" name="Image 1"/>
+          <p:cNvPicPr>
+            <a:picLocks noChangeAspect="1"/>
+          </p:cNvPicPr>
+          <p:nvPr/>
+        </p:nvPicPr>
+        <p:blipFill>
+          <a:blip r:embed="rId2">
+            <a:extLst>
+              <a:ext uri="{28A0092B-C50C-407E-A947-70E740481C1C}">
+                <a14:useLocalDpi xmlns:a14="http://schemas.microsoft.com/office/drawing/2010/main" val="0"/>
+              </a:ext>
+            </a:extLst>
+          </a:blip>
+          <a:stretch>
+            <a:fillRect/>
+          </a:stretch>
+        </p:blipFill>
+        <p:spPr>
+          <a:xfrm>
+            <a:off x="325440" y="1031845"/>
+            <a:ext cx="5639132" cy="2769265"/>
+          </a:xfrm>
+          <a:prstGeom prst="rect">
+            <a:avLst/>
+          </a:prstGeom>
+          <a:ln w="38100" cap="sq">
+            <a:solidFill>
+              <a:srgbClr val="000000"/>
+            </a:solidFill>
+            <a:prstDash val="solid"/>
+            <a:miter lim="800000"/>
+          </a:ln>
+          <a:effectLst>
+            <a:outerShdw blurRad="50800" dist="38100" dir="2700000" algn="tl" rotWithShape="0">
+              <a:srgbClr val="000000">
+                <a:alpha val="43000"/>
+              </a:srgbClr>
+            </a:outerShdw>
+          </a:effectLst>
+        </p:spPr>
+      </p:pic>
+      <p:pic>
+        <p:nvPicPr>
+          <p:cNvPr id="3" name="Image 2"/>
+          <p:cNvPicPr>
+            <a:picLocks noChangeAspect="1"/>
+          </p:cNvPicPr>
+          <p:nvPr/>
+        </p:nvPicPr>
+        <p:blipFill>
+          <a:blip r:embed="rId3">
+            <a:extLst>
+              <a:ext uri="{28A0092B-C50C-407E-A947-70E740481C1C}">
+                <a14:useLocalDpi xmlns:a14="http://schemas.microsoft.com/office/drawing/2010/main" val="0"/>
+              </a:ext>
+            </a:extLst>
+          </a:blip>
+          <a:stretch>
+            <a:fillRect/>
+          </a:stretch>
+        </p:blipFill>
+        <p:spPr>
+          <a:xfrm>
+            <a:off x="6290013" y="3801110"/>
+            <a:ext cx="5639500" cy="2769265"/>
+          </a:xfrm>
+          <a:prstGeom prst="rect">
+            <a:avLst/>
+          </a:prstGeom>
+          <a:ln w="38100" cap="sq">
+            <a:solidFill>
+              <a:srgbClr val="000000"/>
+            </a:solidFill>
+            <a:prstDash val="solid"/>
+            <a:miter lim="800000"/>
+          </a:ln>
+          <a:effectLst>
+            <a:outerShdw blurRad="50800" dist="38100" dir="2700000" algn="tl" rotWithShape="0">
+              <a:srgbClr val="000000">
+                <a:alpha val="43000"/>
+              </a:srgbClr>
+            </a:outerShdw>
+          </a:effectLst>
+        </p:spPr>
+      </p:pic>
+      <p:sp>
+        <p:nvSpPr>
+          <p:cNvPr id="5" name="Rectangle : coins arrondis 4"/>
+          <p:cNvSpPr/>
+          <p:nvPr/>
+        </p:nvSpPr>
+        <p:spPr>
+          <a:xfrm>
+            <a:off x="6358856" y="5050173"/>
+            <a:ext cx="2525086" cy="201336"/>
+          </a:xfrm>
+          <a:prstGeom prst="roundRect">
+            <a:avLst/>
+          </a:prstGeom>
+          <a:noFill/>
+          <a:ln w="38100">
+            <a:solidFill>
+              <a:srgbClr val="FF0000"/>
+            </a:solidFill>
+          </a:ln>
+        </p:spPr>
+        <p:style>
+          <a:lnRef idx="2">
+            <a:schemeClr val="accent1">
+              <a:shade val="50000"/>
+            </a:schemeClr>
+          </a:lnRef>
+          <a:fillRef idx="1">
+            <a:schemeClr val="accent1"/>
+          </a:fillRef>
+          <a:effectRef idx="0">
+            <a:schemeClr val="accent1"/>
+          </a:effectRef>
+          <a:fontRef idx="minor">
+            <a:schemeClr val="lt1"/>
+          </a:fontRef>
+        </p:style>
+        <p:txBody>
+          <a:bodyPr rtlCol="0" anchor="ctr"/>
+          <a:lstStyle/>
+          <a:p>
+            <a:pPr algn="ctr"/>
+            <a:endParaRPr lang="fr-FR"/>
+          </a:p>
+        </p:txBody>
+      </p:sp>
+    </p:spTree>
+    <p:extLst>
+      <p:ext uri="{BB962C8B-B14F-4D97-AF65-F5344CB8AC3E}">
+        <p14:creationId xmlns:p14="http://schemas.microsoft.com/office/powerpoint/2010/main" val="840292294"/>
+      </p:ext>
+    </p:extLst>
+  </p:cSld>
+  <p:clrMapOvr>
+    <a:masterClrMapping/>
+  </p:clrMapOvr>
+</p:sld>
+</file>
+
+<file path=ppt/slides/slide14.xml><?xml version="1.0" encoding="utf-8"?>
+<p:sld xmlns:a="http://schemas.openxmlformats.org/drawingml/2006/main" xmlns:r="http://schemas.openxmlformats.org/officeDocument/2006/relationships" xmlns:p="http://schemas.openxmlformats.org/presentationml/2006/main">
+  <p:cSld>
+    <p:spTree>
+      <p:nvGrpSpPr>
+        <p:cNvPr id="1" name=""/>
+        <p:cNvGrpSpPr/>
+        <p:nvPr/>
+      </p:nvGrpSpPr>
+      <p:grpSpPr>
+        <a:xfrm>
+          <a:off x="0" y="0"/>
+          <a:ext cx="0" cy="0"/>
+          <a:chOff x="0" y="0"/>
+          <a:chExt cx="0" cy="0"/>
+        </a:xfrm>
+      </p:grpSpPr>
+      <p:sp>
+        <p:nvSpPr>
+          <p:cNvPr id="4" name="Rectangle 3"/>
+          <p:cNvSpPr/>
+          <p:nvPr/>
+        </p:nvSpPr>
+        <p:spPr>
+          <a:xfrm>
+            <a:off x="-41293" y="121741"/>
+            <a:ext cx="5511445" cy="707886"/>
+          </a:xfrm>
+          <a:prstGeom prst="rect">
+            <a:avLst/>
+          </a:prstGeom>
+          <a:noFill/>
+        </p:spPr>
+        <p:txBody>
+          <a:bodyPr wrap="none" lIns="91440" tIns="45720" rIns="91440" bIns="45720">
+            <a:spAutoFit/>
+          </a:bodyPr>
+          <a:lstStyle/>
+          <a:p>
+            <a:pPr algn="ctr"/>
+            <a:r>
+              <a:rPr lang="fr-FR" sz="4000" b="1" dirty="0">
+                <a:ln w="13462">
+                  <a:solidFill>
+                    <a:schemeClr val="bg1"/>
+                  </a:solidFill>
+                  <a:prstDash val="solid"/>
+                </a:ln>
+                <a:solidFill>
+                  <a:schemeClr val="tx1">
+                    <a:lumMod val="85000"/>
+                    <a:lumOff val="15000"/>
+                  </a:schemeClr>
+                </a:solidFill>
+                <a:effectLst>
+                  <a:outerShdw dist="38100" dir="2700000" algn="bl" rotWithShape="0">
+                    <a:schemeClr val="accent5"/>
+                  </a:outerShdw>
+                </a:effectLst>
+                <a:latin typeface="Bauhaus 93" panose="04030905020B02020C02" pitchFamily="82" charset="0"/>
+              </a:rPr>
+              <a:t>Conception - Affichage</a:t>
+            </a:r>
+          </a:p>
+        </p:txBody>
+      </p:sp>
+      <p:pic>
+        <p:nvPicPr>
+          <p:cNvPr id="3" name="Image 2"/>
+          <p:cNvPicPr>
+            <a:picLocks noChangeAspect="1"/>
+          </p:cNvPicPr>
+          <p:nvPr/>
+        </p:nvPicPr>
+        <p:blipFill>
+          <a:blip r:embed="rId2">
+            <a:extLst>
+              <a:ext uri="{28A0092B-C50C-407E-A947-70E740481C1C}">
+                <a14:useLocalDpi xmlns:a14="http://schemas.microsoft.com/office/drawing/2010/main" val="0"/>
+              </a:ext>
+            </a:extLst>
+          </a:blip>
+          <a:stretch>
+            <a:fillRect/>
+          </a:stretch>
+        </p:blipFill>
+        <p:spPr>
+          <a:xfrm>
+            <a:off x="581397" y="1967718"/>
+            <a:ext cx="2791215" cy="4734586"/>
+          </a:xfrm>
+          <a:prstGeom prst="rect">
+            <a:avLst/>
+          </a:prstGeom>
+          <a:ln w="38100" cap="sq">
+            <a:solidFill>
+              <a:srgbClr val="000000"/>
+            </a:solidFill>
+            <a:prstDash val="solid"/>
+            <a:miter lim="800000"/>
+          </a:ln>
+          <a:effectLst>
+            <a:outerShdw blurRad="50800" dist="38100" dir="2700000" algn="tl" rotWithShape="0">
+              <a:srgbClr val="000000">
+                <a:alpha val="43000"/>
+              </a:srgbClr>
+            </a:outerShdw>
+          </a:effectLst>
+        </p:spPr>
+      </p:pic>
+      <p:pic>
+        <p:nvPicPr>
+          <p:cNvPr id="5" name="Image 4"/>
+          <p:cNvPicPr>
+            <a:picLocks noChangeAspect="1"/>
+          </p:cNvPicPr>
+          <p:nvPr/>
+        </p:nvPicPr>
+        <p:blipFill>
+          <a:blip r:embed="rId3">
+            <a:extLst>
+              <a:ext uri="{28A0092B-C50C-407E-A947-70E740481C1C}">
+                <a14:useLocalDpi xmlns:a14="http://schemas.microsoft.com/office/drawing/2010/main" val="0"/>
+              </a:ext>
+            </a:extLst>
+          </a:blip>
+          <a:stretch>
+            <a:fillRect/>
+          </a:stretch>
+        </p:blipFill>
+        <p:spPr>
+          <a:xfrm>
+            <a:off x="3851821" y="1172223"/>
+            <a:ext cx="4176443" cy="423925"/>
+          </a:xfrm>
+          <a:prstGeom prst="roundRect">
+            <a:avLst>
+              <a:gd name="adj" fmla="val 8594"/>
+            </a:avLst>
+          </a:prstGeom>
+          <a:solidFill>
+            <a:srgbClr val="FFFFFF">
+              <a:shade val="85000"/>
+            </a:srgbClr>
+          </a:solidFill>
+          <a:ln>
+            <a:noFill/>
+          </a:ln>
+          <a:effectLst>
+            <a:reflection blurRad="12700" stA="38000" endPos="28000" dist="5000" dir="5400000" sy="-100000" algn="bl" rotWithShape="0"/>
+          </a:effectLst>
+        </p:spPr>
+      </p:pic>
+    </p:spTree>
+    <p:extLst>
+      <p:ext uri="{BB962C8B-B14F-4D97-AF65-F5344CB8AC3E}">
+        <p14:creationId xmlns:p14="http://schemas.microsoft.com/office/powerpoint/2010/main" val="13481380"/>
+      </p:ext>
+    </p:extLst>
+  </p:cSld>
+  <p:clrMapOvr>
+    <a:masterClrMapping/>
+  </p:clrMapOvr>
+</p:sld>
+</file>
+
+<file path=ppt/slides/slide15.xml><?xml version="1.0" encoding="utf-8"?>
+<p:sld xmlns:a="http://schemas.openxmlformats.org/drawingml/2006/main" xmlns:r="http://schemas.openxmlformats.org/officeDocument/2006/relationships" xmlns:p="http://schemas.openxmlformats.org/presentationml/2006/main">
+  <p:cSld>
+    <p:spTree>
+      <p:nvGrpSpPr>
+        <p:cNvPr id="1" name=""/>
+        <p:cNvGrpSpPr/>
+        <p:nvPr/>
+      </p:nvGrpSpPr>
+      <p:grpSpPr>
+        <a:xfrm>
+          <a:off x="0" y="0"/>
+          <a:ext cx="0" cy="0"/>
+          <a:chOff x="0" y="0"/>
+          <a:chExt cx="0" cy="0"/>
+        </a:xfrm>
+      </p:grpSpPr>
+      <p:sp>
+        <p:nvSpPr>
+          <p:cNvPr id="4" name="Rectangle 3"/>
+          <p:cNvSpPr/>
+          <p:nvPr/>
+        </p:nvSpPr>
+        <p:spPr>
+          <a:xfrm>
+            <a:off x="-41293" y="121741"/>
+            <a:ext cx="5511445" cy="707886"/>
+          </a:xfrm>
+          <a:prstGeom prst="rect">
+            <a:avLst/>
+          </a:prstGeom>
+          <a:noFill/>
+        </p:spPr>
+        <p:txBody>
+          <a:bodyPr wrap="none" lIns="91440" tIns="45720" rIns="91440" bIns="45720">
+            <a:spAutoFit/>
+          </a:bodyPr>
+          <a:lstStyle/>
+          <a:p>
+            <a:pPr algn="ctr"/>
+            <a:r>
+              <a:rPr lang="fr-FR" sz="4000" b="1" dirty="0">
+                <a:ln w="13462">
+                  <a:solidFill>
+                    <a:schemeClr val="bg1"/>
+                  </a:solidFill>
+                  <a:prstDash val="solid"/>
+                </a:ln>
+                <a:solidFill>
+                  <a:schemeClr val="tx1">
+                    <a:lumMod val="85000"/>
+                    <a:lumOff val="15000"/>
+                  </a:schemeClr>
+                </a:solidFill>
+                <a:effectLst>
+                  <a:outerShdw dist="38100" dir="2700000" algn="bl" rotWithShape="0">
+                    <a:schemeClr val="accent5"/>
+                  </a:outerShdw>
+                </a:effectLst>
+                <a:latin typeface="Bauhaus 93" panose="04030905020B02020C02" pitchFamily="82" charset="0"/>
+              </a:rPr>
+              <a:t>Conception - Affichage</a:t>
+            </a:r>
+          </a:p>
+        </p:txBody>
+      </p:sp>
+      <p:pic>
+        <p:nvPicPr>
+          <p:cNvPr id="2" name="Image 1"/>
+          <p:cNvPicPr>
+            <a:picLocks noChangeAspect="1"/>
+          </p:cNvPicPr>
+          <p:nvPr/>
+        </p:nvPicPr>
+        <p:blipFill>
+          <a:blip r:embed="rId2">
+            <a:extLst>
+              <a:ext uri="{28A0092B-C50C-407E-A947-70E740481C1C}">
+                <a14:useLocalDpi xmlns:a14="http://schemas.microsoft.com/office/drawing/2010/main" val="0"/>
+              </a:ext>
+            </a:extLst>
+          </a:blip>
+          <a:stretch>
+            <a:fillRect/>
+          </a:stretch>
+        </p:blipFill>
+        <p:spPr>
+          <a:xfrm>
+            <a:off x="325440" y="1031845"/>
+            <a:ext cx="5639132" cy="2769265"/>
+          </a:xfrm>
+          <a:prstGeom prst="rect">
+            <a:avLst/>
+          </a:prstGeom>
+          <a:ln w="38100" cap="sq">
+            <a:solidFill>
+              <a:srgbClr val="000000"/>
+            </a:solidFill>
+            <a:prstDash val="solid"/>
+            <a:miter lim="800000"/>
+          </a:ln>
+          <a:effectLst>
+            <a:outerShdw blurRad="50800" dist="38100" dir="2700000" algn="tl" rotWithShape="0">
+              <a:srgbClr val="000000">
+                <a:alpha val="43000"/>
+              </a:srgbClr>
+            </a:outerShdw>
+          </a:effectLst>
+        </p:spPr>
+      </p:pic>
+      <p:pic>
+        <p:nvPicPr>
+          <p:cNvPr id="3" name="Image 2"/>
+          <p:cNvPicPr>
+            <a:picLocks noChangeAspect="1"/>
+          </p:cNvPicPr>
+          <p:nvPr/>
+        </p:nvPicPr>
+        <p:blipFill>
+          <a:blip r:embed="rId3">
+            <a:extLst>
+              <a:ext uri="{28A0092B-C50C-407E-A947-70E740481C1C}">
+                <a14:useLocalDpi xmlns:a14="http://schemas.microsoft.com/office/drawing/2010/main" val="0"/>
+              </a:ext>
+            </a:extLst>
+          </a:blip>
+          <a:stretch>
+            <a:fillRect/>
+          </a:stretch>
+        </p:blipFill>
+        <p:spPr>
+          <a:xfrm>
+            <a:off x="6290013" y="3801110"/>
+            <a:ext cx="5639500" cy="2769265"/>
+          </a:xfrm>
+          <a:prstGeom prst="rect">
+            <a:avLst/>
+          </a:prstGeom>
+          <a:ln w="38100" cap="sq">
+            <a:solidFill>
+              <a:srgbClr val="000000"/>
+            </a:solidFill>
+            <a:prstDash val="solid"/>
+            <a:miter lim="800000"/>
+          </a:ln>
+          <a:effectLst>
+            <a:outerShdw blurRad="50800" dist="38100" dir="2700000" algn="tl" rotWithShape="0">
+              <a:srgbClr val="000000">
+                <a:alpha val="43000"/>
+              </a:srgbClr>
+            </a:outerShdw>
+          </a:effectLst>
+        </p:spPr>
+      </p:pic>
+      <p:sp>
+        <p:nvSpPr>
+          <p:cNvPr id="5" name="Rectangle : coins arrondis 4"/>
+          <p:cNvSpPr/>
+          <p:nvPr/>
+        </p:nvSpPr>
+        <p:spPr>
+          <a:xfrm>
+            <a:off x="6367244" y="5511568"/>
+            <a:ext cx="3305262" cy="209724"/>
+          </a:xfrm>
+          <a:prstGeom prst="roundRect">
+            <a:avLst/>
+          </a:prstGeom>
+          <a:noFill/>
+          <a:ln w="38100">
+            <a:solidFill>
+              <a:srgbClr val="FF0000"/>
+            </a:solidFill>
+          </a:ln>
+        </p:spPr>
+        <p:style>
+          <a:lnRef idx="2">
+            <a:schemeClr val="accent1">
+              <a:shade val="50000"/>
+            </a:schemeClr>
+          </a:lnRef>
+          <a:fillRef idx="1">
+            <a:schemeClr val="accent1"/>
+          </a:fillRef>
+          <a:effectRef idx="0">
+            <a:schemeClr val="accent1"/>
+          </a:effectRef>
+          <a:fontRef idx="minor">
+            <a:schemeClr val="lt1"/>
+          </a:fontRef>
+        </p:style>
+        <p:txBody>
+          <a:bodyPr rtlCol="0" anchor="ctr"/>
+          <a:lstStyle/>
+          <a:p>
+            <a:pPr algn="ctr"/>
+            <a:endParaRPr lang="fr-FR"/>
+          </a:p>
+        </p:txBody>
+      </p:sp>
+    </p:spTree>
+    <p:extLst>
+      <p:ext uri="{BB962C8B-B14F-4D97-AF65-F5344CB8AC3E}">
+        <p14:creationId xmlns:p14="http://schemas.microsoft.com/office/powerpoint/2010/main" val="1622784451"/>
+      </p:ext>
+    </p:extLst>
+  </p:cSld>
+  <p:clrMapOvr>
+    <a:masterClrMapping/>
+  </p:clrMapOvr>
+</p:sld>
+</file>
+
+<file path=ppt/slides/slide16.xml><?xml version="1.0" encoding="utf-8"?>
+<p:sld xmlns:a="http://schemas.openxmlformats.org/drawingml/2006/main" xmlns:r="http://schemas.openxmlformats.org/officeDocument/2006/relationships" xmlns:p="http://schemas.openxmlformats.org/presentationml/2006/main">
+  <p:cSld>
+    <p:spTree>
+      <p:nvGrpSpPr>
+        <p:cNvPr id="1" name=""/>
+        <p:cNvGrpSpPr/>
+        <p:nvPr/>
+      </p:nvGrpSpPr>
+      <p:grpSpPr>
+        <a:xfrm>
+          <a:off x="0" y="0"/>
+          <a:ext cx="0" cy="0"/>
+          <a:chOff x="0" y="0"/>
+          <a:chExt cx="0" cy="0"/>
+        </a:xfrm>
+      </p:grpSpPr>
+      <p:sp>
+        <p:nvSpPr>
+          <p:cNvPr id="4" name="Rectangle 3"/>
+          <p:cNvSpPr/>
+          <p:nvPr/>
+        </p:nvSpPr>
+        <p:spPr>
+          <a:xfrm>
+            <a:off x="-41293" y="121741"/>
+            <a:ext cx="5511445" cy="707886"/>
+          </a:xfrm>
+          <a:prstGeom prst="rect">
+            <a:avLst/>
+          </a:prstGeom>
+          <a:noFill/>
+        </p:spPr>
+        <p:txBody>
+          <a:bodyPr wrap="none" lIns="91440" tIns="45720" rIns="91440" bIns="45720">
+            <a:spAutoFit/>
+          </a:bodyPr>
+          <a:lstStyle/>
+          <a:p>
+            <a:pPr algn="ctr"/>
+            <a:r>
+              <a:rPr lang="fr-FR" sz="4000" b="1" dirty="0">
+                <a:ln w="13462">
+                  <a:solidFill>
+                    <a:schemeClr val="bg1"/>
+                  </a:solidFill>
+                  <a:prstDash val="solid"/>
+                </a:ln>
+                <a:solidFill>
+                  <a:schemeClr val="tx1">
+                    <a:lumMod val="85000"/>
+                    <a:lumOff val="15000"/>
+                  </a:schemeClr>
+                </a:solidFill>
+                <a:effectLst>
+                  <a:outerShdw dist="38100" dir="2700000" algn="bl" rotWithShape="0">
+                    <a:schemeClr val="accent5"/>
+                  </a:outerShdw>
+                </a:effectLst>
+                <a:latin typeface="Bauhaus 93" panose="04030905020B02020C02" pitchFamily="82" charset="0"/>
+              </a:rPr>
+              <a:t>Conception - Affichage</a:t>
+            </a:r>
+          </a:p>
+        </p:txBody>
+      </p:sp>
+      <p:pic>
+        <p:nvPicPr>
+          <p:cNvPr id="3" name="Image 2"/>
+          <p:cNvPicPr>
+            <a:picLocks noChangeAspect="1"/>
+          </p:cNvPicPr>
+          <p:nvPr/>
+        </p:nvPicPr>
+        <p:blipFill>
+          <a:blip r:embed="rId2">
+            <a:extLst>
+              <a:ext uri="{28A0092B-C50C-407E-A947-70E740481C1C}">
+                <a14:useLocalDpi xmlns:a14="http://schemas.microsoft.com/office/drawing/2010/main" val="0"/>
+              </a:ext>
+            </a:extLst>
+          </a:blip>
+          <a:stretch>
+            <a:fillRect/>
+          </a:stretch>
+        </p:blipFill>
+        <p:spPr>
+          <a:xfrm>
+            <a:off x="581397" y="1967718"/>
+            <a:ext cx="2791215" cy="4734586"/>
+          </a:xfrm>
+          <a:prstGeom prst="rect">
+            <a:avLst/>
+          </a:prstGeom>
+          <a:ln w="38100" cap="sq">
+            <a:solidFill>
+              <a:srgbClr val="000000"/>
+            </a:solidFill>
+            <a:prstDash val="solid"/>
+            <a:miter lim="800000"/>
+          </a:ln>
+          <a:effectLst>
+            <a:outerShdw blurRad="50800" dist="38100" dir="2700000" algn="tl" rotWithShape="0">
+              <a:srgbClr val="000000">
+                <a:alpha val="43000"/>
+              </a:srgbClr>
+            </a:outerShdw>
+          </a:effectLst>
+        </p:spPr>
+      </p:pic>
+      <p:pic>
+        <p:nvPicPr>
+          <p:cNvPr id="5" name="Image 4"/>
+          <p:cNvPicPr>
+            <a:picLocks noChangeAspect="1"/>
+          </p:cNvPicPr>
+          <p:nvPr/>
+        </p:nvPicPr>
+        <p:blipFill>
+          <a:blip r:embed="rId3">
+            <a:extLst>
+              <a:ext uri="{28A0092B-C50C-407E-A947-70E740481C1C}">
+                <a14:useLocalDpi xmlns:a14="http://schemas.microsoft.com/office/drawing/2010/main" val="0"/>
+              </a:ext>
+            </a:extLst>
+          </a:blip>
+          <a:stretch>
+            <a:fillRect/>
+          </a:stretch>
+        </p:blipFill>
+        <p:spPr>
+          <a:xfrm>
+            <a:off x="3826655" y="1169289"/>
+            <a:ext cx="4176442" cy="1102934"/>
+          </a:xfrm>
+          <a:prstGeom prst="roundRect">
+            <a:avLst>
+              <a:gd name="adj" fmla="val 8594"/>
+            </a:avLst>
+          </a:prstGeom>
+          <a:solidFill>
+            <a:srgbClr val="FFFFFF">
+              <a:shade val="85000"/>
+            </a:srgbClr>
+          </a:solidFill>
+          <a:ln>
+            <a:noFill/>
+          </a:ln>
+          <a:effectLst>
+            <a:reflection blurRad="12700" stA="38000" endPos="28000" dist="5000" dir="5400000" sy="-100000" algn="bl" rotWithShape="0"/>
+          </a:effectLst>
+        </p:spPr>
+      </p:pic>
+      <p:pic>
+        <p:nvPicPr>
+          <p:cNvPr id="6" name="Image 5"/>
+          <p:cNvPicPr>
+            <a:picLocks noChangeAspect="1"/>
+          </p:cNvPicPr>
+          <p:nvPr/>
+        </p:nvPicPr>
+        <p:blipFill>
+          <a:blip r:embed="rId4">
+            <a:extLst>
+              <a:ext uri="{28A0092B-C50C-407E-A947-70E740481C1C}">
+                <a14:useLocalDpi xmlns:a14="http://schemas.microsoft.com/office/drawing/2010/main" val="0"/>
+              </a:ext>
+            </a:extLst>
+          </a:blip>
+          <a:stretch>
+            <a:fillRect/>
+          </a:stretch>
+        </p:blipFill>
+        <p:spPr>
+          <a:xfrm>
+            <a:off x="8457140" y="1967718"/>
+            <a:ext cx="2791215" cy="4753638"/>
+          </a:xfrm>
+          <a:prstGeom prst="rect">
+            <a:avLst/>
+          </a:prstGeom>
+        </p:spPr>
+      </p:pic>
+    </p:spTree>
+    <p:extLst>
+      <p:ext uri="{BB962C8B-B14F-4D97-AF65-F5344CB8AC3E}">
+        <p14:creationId xmlns:p14="http://schemas.microsoft.com/office/powerpoint/2010/main" val="51222012"/>
+      </p:ext>
+    </p:extLst>
+  </p:cSld>
+  <p:clrMapOvr>
+    <a:masterClrMapping/>
+  </p:clrMapOvr>
+</p:sld>
+</file>
+
+<file path=ppt/slides/slide17.xml><?xml version="1.0" encoding="utf-8"?>
+<p:sld xmlns:a="http://schemas.openxmlformats.org/drawingml/2006/main" xmlns:r="http://schemas.openxmlformats.org/officeDocument/2006/relationships" xmlns:p="http://schemas.openxmlformats.org/presentationml/2006/main">
+  <p:cSld>
+    <p:spTree>
+      <p:nvGrpSpPr>
+        <p:cNvPr id="1" name=""/>
+        <p:cNvGrpSpPr/>
+        <p:nvPr/>
+      </p:nvGrpSpPr>
+      <p:grpSpPr>
+        <a:xfrm>
+          <a:off x="0" y="0"/>
+          <a:ext cx="0" cy="0"/>
+          <a:chOff x="0" y="0"/>
+          <a:chExt cx="0" cy="0"/>
+        </a:xfrm>
+      </p:grpSpPr>
+      <p:sp>
+        <p:nvSpPr>
+          <p:cNvPr id="4" name="Rectangle 3"/>
+          <p:cNvSpPr/>
+          <p:nvPr/>
+        </p:nvSpPr>
+        <p:spPr>
+          <a:xfrm>
+            <a:off x="-41293" y="121741"/>
+            <a:ext cx="5511445" cy="707886"/>
+          </a:xfrm>
+          <a:prstGeom prst="rect">
+            <a:avLst/>
+          </a:prstGeom>
+          <a:noFill/>
+        </p:spPr>
+        <p:txBody>
+          <a:bodyPr wrap="none" lIns="91440" tIns="45720" rIns="91440" bIns="45720">
+            <a:spAutoFit/>
+          </a:bodyPr>
+          <a:lstStyle/>
+          <a:p>
+            <a:pPr algn="ctr"/>
+            <a:r>
+              <a:rPr lang="fr-FR" sz="4000" b="1" dirty="0">
+                <a:ln w="13462">
+                  <a:solidFill>
+                    <a:schemeClr val="bg1"/>
+                  </a:solidFill>
+                  <a:prstDash val="solid"/>
+                </a:ln>
+                <a:solidFill>
+                  <a:schemeClr val="tx1">
+                    <a:lumMod val="85000"/>
+                    <a:lumOff val="15000"/>
+                  </a:schemeClr>
+                </a:solidFill>
+                <a:effectLst>
+                  <a:outerShdw dist="38100" dir="2700000" algn="bl" rotWithShape="0">
+                    <a:schemeClr val="accent5"/>
+                  </a:outerShdw>
+                </a:effectLst>
+                <a:latin typeface="Bauhaus 93" panose="04030905020B02020C02" pitchFamily="82" charset="0"/>
+              </a:rPr>
+              <a:t>Conception - Affichage</a:t>
+            </a:r>
+          </a:p>
+        </p:txBody>
+      </p:sp>
+      <p:pic>
+        <p:nvPicPr>
+          <p:cNvPr id="2" name="Image 1"/>
+          <p:cNvPicPr>
+            <a:picLocks noChangeAspect="1"/>
+          </p:cNvPicPr>
+          <p:nvPr/>
+        </p:nvPicPr>
+        <p:blipFill>
+          <a:blip r:embed="rId2">
+            <a:extLst>
+              <a:ext uri="{28A0092B-C50C-407E-A947-70E740481C1C}">
+                <a14:useLocalDpi xmlns:a14="http://schemas.microsoft.com/office/drawing/2010/main" val="0"/>
+              </a:ext>
+            </a:extLst>
+          </a:blip>
+          <a:stretch>
+            <a:fillRect/>
+          </a:stretch>
+        </p:blipFill>
+        <p:spPr>
+          <a:xfrm>
+            <a:off x="325440" y="1031845"/>
+            <a:ext cx="5639132" cy="2769265"/>
+          </a:xfrm>
+          <a:prstGeom prst="rect">
+            <a:avLst/>
+          </a:prstGeom>
+          <a:ln w="38100" cap="sq">
+            <a:solidFill>
+              <a:srgbClr val="000000"/>
+            </a:solidFill>
+            <a:prstDash val="solid"/>
+            <a:miter lim="800000"/>
+          </a:ln>
+          <a:effectLst>
+            <a:outerShdw blurRad="50800" dist="38100" dir="2700000" algn="tl" rotWithShape="0">
+              <a:srgbClr val="000000">
+                <a:alpha val="43000"/>
+              </a:srgbClr>
+            </a:outerShdw>
+          </a:effectLst>
+        </p:spPr>
+      </p:pic>
+      <p:pic>
+        <p:nvPicPr>
+          <p:cNvPr id="3" name="Image 2"/>
+          <p:cNvPicPr>
+            <a:picLocks noChangeAspect="1"/>
+          </p:cNvPicPr>
+          <p:nvPr/>
+        </p:nvPicPr>
+        <p:blipFill>
+          <a:blip r:embed="rId3">
+            <a:extLst>
+              <a:ext uri="{28A0092B-C50C-407E-A947-70E740481C1C}">
+                <a14:useLocalDpi xmlns:a14="http://schemas.microsoft.com/office/drawing/2010/main" val="0"/>
+              </a:ext>
+            </a:extLst>
+          </a:blip>
+          <a:stretch>
+            <a:fillRect/>
+          </a:stretch>
+        </p:blipFill>
+        <p:spPr>
+          <a:xfrm>
+            <a:off x="6290013" y="3801110"/>
+            <a:ext cx="5639500" cy="2769265"/>
+          </a:xfrm>
+          <a:prstGeom prst="rect">
+            <a:avLst/>
+          </a:prstGeom>
+          <a:ln w="38100" cap="sq">
+            <a:solidFill>
+              <a:srgbClr val="000000"/>
+            </a:solidFill>
+            <a:prstDash val="solid"/>
+            <a:miter lim="800000"/>
+          </a:ln>
+          <a:effectLst>
+            <a:outerShdw blurRad="50800" dist="38100" dir="2700000" algn="tl" rotWithShape="0">
+              <a:srgbClr val="000000">
+                <a:alpha val="43000"/>
+              </a:srgbClr>
+            </a:outerShdw>
+          </a:effectLst>
+        </p:spPr>
+      </p:pic>
+      <p:sp>
+        <p:nvSpPr>
+          <p:cNvPr id="5" name="Rectangle : coins arrondis 4"/>
+          <p:cNvSpPr/>
+          <p:nvPr/>
+        </p:nvSpPr>
+        <p:spPr>
+          <a:xfrm>
+            <a:off x="6358855" y="5981351"/>
+            <a:ext cx="2139193" cy="209724"/>
+          </a:xfrm>
+          <a:prstGeom prst="roundRect">
+            <a:avLst/>
+          </a:prstGeom>
+          <a:noFill/>
+          <a:ln w="38100">
+            <a:solidFill>
+              <a:srgbClr val="FF0000"/>
+            </a:solidFill>
+          </a:ln>
+        </p:spPr>
+        <p:style>
+          <a:lnRef idx="2">
+            <a:schemeClr val="accent1">
+              <a:shade val="50000"/>
+            </a:schemeClr>
+          </a:lnRef>
+          <a:fillRef idx="1">
+            <a:schemeClr val="accent1"/>
+          </a:fillRef>
+          <a:effectRef idx="0">
+            <a:schemeClr val="accent1"/>
+          </a:effectRef>
+          <a:fontRef idx="minor">
+            <a:schemeClr val="lt1"/>
+          </a:fontRef>
+        </p:style>
+        <p:txBody>
+          <a:bodyPr rtlCol="0" anchor="ctr"/>
+          <a:lstStyle/>
+          <a:p>
+            <a:pPr algn="ctr"/>
+            <a:endParaRPr lang="fr-FR"/>
+          </a:p>
+        </p:txBody>
+      </p:sp>
+    </p:spTree>
+    <p:extLst>
+      <p:ext uri="{BB962C8B-B14F-4D97-AF65-F5344CB8AC3E}">
+        <p14:creationId xmlns:p14="http://schemas.microsoft.com/office/powerpoint/2010/main" val="438638355"/>
+      </p:ext>
+    </p:extLst>
+  </p:cSld>
+  <p:clrMapOvr>
+    <a:masterClrMapping/>
+  </p:clrMapOvr>
+</p:sld>
+</file>
+
+<file path=ppt/slides/slide18.xml><?xml version="1.0" encoding="utf-8"?>
+<p:sld xmlns:a="http://schemas.openxmlformats.org/drawingml/2006/main" xmlns:r="http://schemas.openxmlformats.org/officeDocument/2006/relationships" xmlns:p="http://schemas.openxmlformats.org/presentationml/2006/main">
+  <p:cSld>
+    <p:spTree>
+      <p:nvGrpSpPr>
+        <p:cNvPr id="1" name=""/>
+        <p:cNvGrpSpPr/>
+        <p:nvPr/>
+      </p:nvGrpSpPr>
+      <p:grpSpPr>
+        <a:xfrm>
+          <a:off x="0" y="0"/>
+          <a:ext cx="0" cy="0"/>
+          <a:chOff x="0" y="0"/>
+          <a:chExt cx="0" cy="0"/>
+        </a:xfrm>
+      </p:grpSpPr>
+      <p:sp>
+        <p:nvSpPr>
+          <p:cNvPr id="4" name="Rectangle 3"/>
+          <p:cNvSpPr/>
+          <p:nvPr/>
+        </p:nvSpPr>
+        <p:spPr>
+          <a:xfrm>
+            <a:off x="-41293" y="121741"/>
+            <a:ext cx="5511445" cy="707886"/>
+          </a:xfrm>
+          <a:prstGeom prst="rect">
+            <a:avLst/>
+          </a:prstGeom>
+          <a:noFill/>
+        </p:spPr>
+        <p:txBody>
+          <a:bodyPr wrap="none" lIns="91440" tIns="45720" rIns="91440" bIns="45720">
+            <a:spAutoFit/>
+          </a:bodyPr>
+          <a:lstStyle/>
+          <a:p>
+            <a:pPr algn="ctr"/>
+            <a:r>
+              <a:rPr lang="fr-FR" sz="4000" b="1" dirty="0">
+                <a:ln w="13462">
+                  <a:solidFill>
+                    <a:schemeClr val="bg1"/>
+                  </a:solidFill>
+                  <a:prstDash val="solid"/>
+                </a:ln>
+                <a:solidFill>
+                  <a:schemeClr val="tx1">
+                    <a:lumMod val="85000"/>
+                    <a:lumOff val="15000"/>
+                  </a:schemeClr>
+                </a:solidFill>
+                <a:effectLst>
+                  <a:outerShdw dist="38100" dir="2700000" algn="bl" rotWithShape="0">
+                    <a:schemeClr val="accent5"/>
+                  </a:outerShdw>
+                </a:effectLst>
+                <a:latin typeface="Bauhaus 93" panose="04030905020B02020C02" pitchFamily="82" charset="0"/>
+              </a:rPr>
+              <a:t>Conception - Affichage</a:t>
+            </a:r>
+          </a:p>
+        </p:txBody>
+      </p:sp>
+      <p:pic>
+        <p:nvPicPr>
+          <p:cNvPr id="2" name="Image 1"/>
+          <p:cNvPicPr>
+            <a:picLocks noChangeAspect="1"/>
+          </p:cNvPicPr>
+          <p:nvPr/>
+        </p:nvPicPr>
+        <p:blipFill>
+          <a:blip r:embed="rId2">
+            <a:extLst>
+              <a:ext uri="{28A0092B-C50C-407E-A947-70E740481C1C}">
+                <a14:useLocalDpi xmlns:a14="http://schemas.microsoft.com/office/drawing/2010/main" val="0"/>
+              </a:ext>
+            </a:extLst>
+          </a:blip>
+          <a:stretch>
+            <a:fillRect/>
+          </a:stretch>
+        </p:blipFill>
+        <p:spPr>
+          <a:xfrm>
+            <a:off x="3826655" y="1169289"/>
+            <a:ext cx="4156306" cy="458175"/>
+          </a:xfrm>
+          <a:prstGeom prst="roundRect">
+            <a:avLst>
+              <a:gd name="adj" fmla="val 8594"/>
+            </a:avLst>
+          </a:prstGeom>
+          <a:solidFill>
+            <a:srgbClr val="FFFFFF">
+              <a:shade val="85000"/>
+            </a:srgbClr>
+          </a:solidFill>
+          <a:ln>
+            <a:noFill/>
+          </a:ln>
+          <a:effectLst>
+            <a:reflection blurRad="12700" stA="38000" endPos="28000" dist="5000" dir="5400000" sy="-100000" algn="bl" rotWithShape="0"/>
+          </a:effectLst>
+        </p:spPr>
+      </p:pic>
+      <p:pic>
+        <p:nvPicPr>
+          <p:cNvPr id="7" name="Image 6"/>
+          <p:cNvPicPr>
+            <a:picLocks noChangeAspect="1"/>
+          </p:cNvPicPr>
+          <p:nvPr/>
+        </p:nvPicPr>
+        <p:blipFill>
+          <a:blip r:embed="rId3">
+            <a:extLst>
+              <a:ext uri="{28A0092B-C50C-407E-A947-70E740481C1C}">
+                <a14:useLocalDpi xmlns:a14="http://schemas.microsoft.com/office/drawing/2010/main" val="0"/>
+              </a:ext>
+            </a:extLst>
+          </a:blip>
+          <a:stretch>
+            <a:fillRect/>
+          </a:stretch>
+        </p:blipFill>
+        <p:spPr>
+          <a:xfrm>
+            <a:off x="713238" y="2975459"/>
+            <a:ext cx="3989762" cy="2648290"/>
+          </a:xfrm>
+          <a:prstGeom prst="rect">
+            <a:avLst/>
+          </a:prstGeom>
+          <a:ln w="38100" cap="sq">
+            <a:solidFill>
+              <a:srgbClr val="000000"/>
+            </a:solidFill>
+            <a:prstDash val="solid"/>
+            <a:miter lim="800000"/>
+          </a:ln>
+          <a:effectLst>
+            <a:outerShdw blurRad="50800" dist="38100" dir="2700000" algn="tl" rotWithShape="0">
+              <a:srgbClr val="000000">
+                <a:alpha val="43000"/>
+              </a:srgbClr>
+            </a:outerShdw>
+          </a:effectLst>
+        </p:spPr>
+      </p:pic>
+      <p:pic>
+        <p:nvPicPr>
+          <p:cNvPr id="8" name="Image 7"/>
+          <p:cNvPicPr>
+            <a:picLocks noChangeAspect="1"/>
+          </p:cNvPicPr>
+          <p:nvPr/>
+        </p:nvPicPr>
+        <p:blipFill>
+          <a:blip r:embed="rId4">
+            <a:extLst>
+              <a:ext uri="{28A0092B-C50C-407E-A947-70E740481C1C}">
+                <a14:useLocalDpi xmlns:a14="http://schemas.microsoft.com/office/drawing/2010/main" val="0"/>
+              </a:ext>
+            </a:extLst>
+          </a:blip>
+          <a:stretch>
+            <a:fillRect/>
+          </a:stretch>
+        </p:blipFill>
+        <p:spPr>
+          <a:xfrm>
+            <a:off x="7340541" y="2975459"/>
+            <a:ext cx="3985378" cy="2648290"/>
+          </a:xfrm>
+          <a:prstGeom prst="rect">
+            <a:avLst/>
+          </a:prstGeom>
+        </p:spPr>
+      </p:pic>
+    </p:spTree>
+    <p:extLst>
+      <p:ext uri="{BB962C8B-B14F-4D97-AF65-F5344CB8AC3E}">
+        <p14:creationId xmlns:p14="http://schemas.microsoft.com/office/powerpoint/2010/main" val="3411233981"/>
+      </p:ext>
+    </p:extLst>
+  </p:cSld>
+  <p:clrMapOvr>
+    <a:masterClrMapping/>
+  </p:clrMapOvr>
+</p:sld>
+</file>
+
+<file path=ppt/slides/slide19.xml><?xml version="1.0" encoding="utf-8"?>
+<p:sld xmlns:a="http://schemas.openxmlformats.org/drawingml/2006/main" xmlns:r="http://schemas.openxmlformats.org/officeDocument/2006/relationships" xmlns:p="http://schemas.openxmlformats.org/presentationml/2006/main">
+  <p:cSld>
+    <p:spTree>
+      <p:nvGrpSpPr>
+        <p:cNvPr id="1" name=""/>
+        <p:cNvGrpSpPr/>
+        <p:nvPr/>
+      </p:nvGrpSpPr>
+      <p:grpSpPr>
+        <a:xfrm>
+          <a:off x="0" y="0"/>
+          <a:ext cx="0" cy="0"/>
+          <a:chOff x="0" y="0"/>
+          <a:chExt cx="0" cy="0"/>
+        </a:xfrm>
+      </p:grpSpPr>
+      <p:sp>
+        <p:nvSpPr>
+          <p:cNvPr id="4" name="Rectangle 3"/>
+          <p:cNvSpPr/>
+          <p:nvPr/>
+        </p:nvSpPr>
+        <p:spPr>
+          <a:xfrm>
+            <a:off x="0" y="87557"/>
+            <a:ext cx="5186035" cy="707886"/>
+          </a:xfrm>
+          <a:prstGeom prst="rect">
+            <a:avLst/>
+          </a:prstGeom>
+          <a:noFill/>
+        </p:spPr>
+        <p:txBody>
+          <a:bodyPr wrap="none" lIns="91440" tIns="45720" rIns="91440" bIns="45720">
+            <a:spAutoFit/>
+          </a:bodyPr>
+          <a:lstStyle/>
+          <a:p>
+            <a:pPr algn="ctr"/>
+            <a:r>
+              <a:rPr lang="fr-FR" sz="4000" b="1" dirty="0">
+                <a:ln w="13462">
+                  <a:solidFill>
+                    <a:schemeClr val="bg1"/>
+                  </a:solidFill>
+                  <a:prstDash val="solid"/>
+                </a:ln>
+                <a:solidFill>
+                  <a:schemeClr val="tx1">
+                    <a:lumMod val="85000"/>
+                    <a:lumOff val="15000"/>
+                  </a:schemeClr>
+                </a:solidFill>
+                <a:effectLst>
+                  <a:outerShdw dist="38100" dir="2700000" algn="bl" rotWithShape="0">
+                    <a:schemeClr val="accent5"/>
+                  </a:outerShdw>
+                </a:effectLst>
+                <a:latin typeface="Bauhaus 93" panose="04030905020B02020C02" pitchFamily="82" charset="0"/>
+              </a:rPr>
+              <a:t>Conception - Scénario</a:t>
+            </a:r>
+          </a:p>
+        </p:txBody>
+      </p:sp>
+    </p:spTree>
+    <p:extLst>
+      <p:ext uri="{BB962C8B-B14F-4D97-AF65-F5344CB8AC3E}">
+        <p14:creationId xmlns:p14="http://schemas.microsoft.com/office/powerpoint/2010/main" val="2774912678"/>
       </p:ext>
     </p:extLst>
   </p:cSld>
@@ -6446,6 +8110,164 @@
     <p:extLst>
       <p:ext uri="{BB962C8B-B14F-4D97-AF65-F5344CB8AC3E}">
         <p14:creationId xmlns:p14="http://schemas.microsoft.com/office/powerpoint/2010/main" val="3142055370"/>
+      </p:ext>
+    </p:extLst>
+  </p:cSld>
+  <p:clrMapOvr>
+    <a:masterClrMapping/>
+  </p:clrMapOvr>
+</p:sld>
+</file>
+
+<file path=ppt/slides/slide20.xml><?xml version="1.0" encoding="utf-8"?>
+<p:sld xmlns:a="http://schemas.openxmlformats.org/drawingml/2006/main" xmlns:r="http://schemas.openxmlformats.org/officeDocument/2006/relationships" xmlns:p="http://schemas.openxmlformats.org/presentationml/2006/main">
+  <p:cSld>
+    <p:spTree>
+      <p:nvGrpSpPr>
+        <p:cNvPr id="1" name=""/>
+        <p:cNvGrpSpPr/>
+        <p:nvPr/>
+      </p:nvGrpSpPr>
+      <p:grpSpPr>
+        <a:xfrm>
+          <a:off x="0" y="0"/>
+          <a:ext cx="0" cy="0"/>
+          <a:chOff x="0" y="0"/>
+          <a:chExt cx="0" cy="0"/>
+        </a:xfrm>
+      </p:grpSpPr>
+      <p:sp>
+        <p:nvSpPr>
+          <p:cNvPr id="4" name="Rectangle 3"/>
+          <p:cNvSpPr/>
+          <p:nvPr/>
+        </p:nvSpPr>
+        <p:spPr>
+          <a:xfrm>
+            <a:off x="0" y="165723"/>
+            <a:ext cx="5900974" cy="707886"/>
+          </a:xfrm>
+          <a:prstGeom prst="rect">
+            <a:avLst/>
+          </a:prstGeom>
+          <a:noFill/>
+        </p:spPr>
+        <p:txBody>
+          <a:bodyPr wrap="none" lIns="91440" tIns="45720" rIns="91440" bIns="45720">
+            <a:spAutoFit/>
+          </a:bodyPr>
+          <a:lstStyle/>
+          <a:p>
+            <a:pPr algn="ctr"/>
+            <a:r>
+              <a:rPr lang="fr-FR" sz="4000" b="1" cap="none" spc="0" dirty="0">
+                <a:ln w="13462">
+                  <a:solidFill>
+                    <a:schemeClr val="bg1"/>
+                  </a:solidFill>
+                  <a:prstDash val="solid"/>
+                </a:ln>
+                <a:solidFill>
+                  <a:schemeClr val="tx1">
+                    <a:lumMod val="85000"/>
+                    <a:lumOff val="15000"/>
+                  </a:schemeClr>
+                </a:solidFill>
+                <a:effectLst>
+                  <a:outerShdw dist="38100" dir="2700000" algn="bl" rotWithShape="0">
+                    <a:schemeClr val="accent5"/>
+                  </a:outerShdw>
+                </a:effectLst>
+                <a:latin typeface="Bauhaus 93" panose="04030905020B02020C02" pitchFamily="82" charset="0"/>
+              </a:rPr>
+              <a:t>Problème / Amélioration</a:t>
+            </a:r>
+          </a:p>
+        </p:txBody>
+      </p:sp>
+    </p:spTree>
+    <p:extLst>
+      <p:ext uri="{BB962C8B-B14F-4D97-AF65-F5344CB8AC3E}">
+        <p14:creationId xmlns:p14="http://schemas.microsoft.com/office/powerpoint/2010/main" val="2803989285"/>
+      </p:ext>
+    </p:extLst>
+  </p:cSld>
+  <p:clrMapOvr>
+    <a:masterClrMapping/>
+  </p:clrMapOvr>
+</p:sld>
+</file>
+
+<file path=ppt/slides/slide21.xml><?xml version="1.0" encoding="utf-8"?>
+<p:sld xmlns:a="http://schemas.openxmlformats.org/drawingml/2006/main" xmlns:r="http://schemas.openxmlformats.org/officeDocument/2006/relationships" xmlns:p="http://schemas.openxmlformats.org/presentationml/2006/main">
+  <p:cSld>
+    <p:spTree>
+      <p:nvGrpSpPr>
+        <p:cNvPr id="1" name=""/>
+        <p:cNvGrpSpPr/>
+        <p:nvPr/>
+      </p:nvGrpSpPr>
+      <p:grpSpPr>
+        <a:xfrm>
+          <a:off x="0" y="0"/>
+          <a:ext cx="0" cy="0"/>
+          <a:chOff x="0" y="0"/>
+          <a:chExt cx="0" cy="0"/>
+        </a:xfrm>
+      </p:grpSpPr>
+      <p:sp>
+        <p:nvSpPr>
+          <p:cNvPr id="4" name="Rectangle 3"/>
+          <p:cNvSpPr/>
+          <p:nvPr/>
+        </p:nvSpPr>
+        <p:spPr>
+          <a:xfrm>
+            <a:off x="72112" y="61920"/>
+            <a:ext cx="4504759" cy="707886"/>
+          </a:xfrm>
+          <a:prstGeom prst="rect">
+            <a:avLst/>
+          </a:prstGeom>
+          <a:noFill/>
+        </p:spPr>
+        <p:txBody>
+          <a:bodyPr wrap="none" lIns="91440" tIns="45720" rIns="91440" bIns="45720">
+            <a:spAutoFit/>
+          </a:bodyPr>
+          <a:lstStyle/>
+          <a:p>
+            <a:pPr algn="ctr"/>
+            <a:r>
+              <a:rPr lang="fr-FR" sz="4000" b="1" cap="none" spc="0" dirty="0">
+                <a:ln w="13462">
+                  <a:solidFill>
+                    <a:schemeClr val="bg1"/>
+                  </a:solidFill>
+                  <a:prstDash val="solid"/>
+                </a:ln>
+                <a:solidFill>
+                  <a:schemeClr val="tx1">
+                    <a:lumMod val="85000"/>
+                    <a:lumOff val="15000"/>
+                  </a:schemeClr>
+                </a:solidFill>
+                <a:effectLst>
+                  <a:outerShdw dist="38100" dir="2700000" algn="bl" rotWithShape="0">
+                    <a:schemeClr val="accent5"/>
+                  </a:outerShdw>
+                </a:effectLst>
+                <a:latin typeface="Bauhaus 93" panose="04030905020B02020C02" pitchFamily="82" charset="0"/>
+              </a:rPr>
+              <a:t>Bilan / Conclusion</a:t>
+            </a:r>
+          </a:p>
+        </p:txBody>
+      </p:sp>
+    </p:spTree>
+    <p:extLst>
+      <p:ext uri="{BB962C8B-B14F-4D97-AF65-F5344CB8AC3E}">
+        <p14:creationId xmlns:p14="http://schemas.microsoft.com/office/powerpoint/2010/main" val="3399395173"/>
       </p:ext>
     </p:extLst>
   </p:cSld>
@@ -7056,6 +8878,214 @@
           </a:p>
         </p:txBody>
       </p:sp>
+      <p:pic>
+        <p:nvPicPr>
+          <p:cNvPr id="2" name="Image 1"/>
+          <p:cNvPicPr>
+            <a:picLocks noChangeAspect="1"/>
+          </p:cNvPicPr>
+          <p:nvPr/>
+        </p:nvPicPr>
+        <p:blipFill>
+          <a:blip r:embed="rId2">
+            <a:extLst>
+              <a:ext uri="{28A0092B-C50C-407E-A947-70E740481C1C}">
+                <a14:useLocalDpi xmlns:a14="http://schemas.microsoft.com/office/drawing/2010/main" val="0"/>
+              </a:ext>
+            </a:extLst>
+          </a:blip>
+          <a:stretch>
+            <a:fillRect/>
+          </a:stretch>
+        </p:blipFill>
+        <p:spPr>
+          <a:xfrm>
+            <a:off x="3623955" y="2418874"/>
+            <a:ext cx="4957984" cy="2871728"/>
+          </a:xfrm>
+          <a:prstGeom prst="rect">
+            <a:avLst/>
+          </a:prstGeom>
+          <a:ln w="38100" cap="sq">
+            <a:solidFill>
+              <a:srgbClr val="000000"/>
+            </a:solidFill>
+            <a:prstDash val="solid"/>
+            <a:miter lim="800000"/>
+          </a:ln>
+          <a:effectLst>
+            <a:outerShdw blurRad="50800" dist="38100" dir="2700000" algn="tl" rotWithShape="0">
+              <a:srgbClr val="000000">
+                <a:alpha val="43000"/>
+              </a:srgbClr>
+            </a:outerShdw>
+          </a:effectLst>
+        </p:spPr>
+      </p:pic>
+      <p:pic>
+        <p:nvPicPr>
+          <p:cNvPr id="3" name="Image 2"/>
+          <p:cNvPicPr>
+            <a:picLocks noChangeAspect="1"/>
+          </p:cNvPicPr>
+          <p:nvPr/>
+        </p:nvPicPr>
+        <p:blipFill>
+          <a:blip r:embed="rId3">
+            <a:extLst>
+              <a:ext uri="{28A0092B-C50C-407E-A947-70E740481C1C}">
+                <a14:useLocalDpi xmlns:a14="http://schemas.microsoft.com/office/drawing/2010/main" val="0"/>
+              </a:ext>
+            </a:extLst>
+          </a:blip>
+          <a:stretch>
+            <a:fillRect/>
+          </a:stretch>
+        </p:blipFill>
+        <p:spPr>
+          <a:xfrm>
+            <a:off x="567855" y="4303552"/>
+            <a:ext cx="2220786" cy="2220786"/>
+          </a:xfrm>
+          <a:prstGeom prst="ellipse">
+            <a:avLst/>
+          </a:prstGeom>
+          <a:ln w="63500" cap="rnd">
+            <a:solidFill>
+              <a:srgbClr val="333333"/>
+            </a:solidFill>
+          </a:ln>
+          <a:effectLst>
+            <a:outerShdw blurRad="381000" dist="292100" dir="5400000" sx="-80000" sy="-18000" rotWithShape="0">
+              <a:srgbClr val="000000">
+                <a:alpha val="22000"/>
+              </a:srgbClr>
+            </a:outerShdw>
+          </a:effectLst>
+          <a:scene3d>
+            <a:camera prst="orthographicFront"/>
+            <a:lightRig rig="contrasting" dir="t">
+              <a:rot lat="0" lon="0" rev="3000000"/>
+            </a:lightRig>
+          </a:scene3d>
+          <a:sp3d contourW="7620">
+            <a:bevelT w="95250" h="31750"/>
+            <a:contourClr>
+              <a:srgbClr val="333333"/>
+            </a:contourClr>
+          </a:sp3d>
+        </p:spPr>
+      </p:pic>
+      <p:pic>
+        <p:nvPicPr>
+          <p:cNvPr id="5" name="Image 4"/>
+          <p:cNvPicPr>
+            <a:picLocks noChangeAspect="1"/>
+          </p:cNvPicPr>
+          <p:nvPr/>
+        </p:nvPicPr>
+        <p:blipFill>
+          <a:blip r:embed="rId4">
+            <a:extLst>
+              <a:ext uri="{28A0092B-C50C-407E-A947-70E740481C1C}">
+                <a14:useLocalDpi xmlns:a14="http://schemas.microsoft.com/office/drawing/2010/main" val="0"/>
+              </a:ext>
+            </a:extLst>
+          </a:blip>
+          <a:stretch>
+            <a:fillRect/>
+          </a:stretch>
+        </p:blipFill>
+        <p:spPr>
+          <a:xfrm>
+            <a:off x="9417253" y="4303552"/>
+            <a:ext cx="2220786" cy="2220786"/>
+          </a:xfrm>
+          <a:prstGeom prst="ellipse">
+            <a:avLst/>
+          </a:prstGeom>
+          <a:ln w="63500" cap="rnd">
+            <a:solidFill>
+              <a:srgbClr val="333333"/>
+            </a:solidFill>
+          </a:ln>
+          <a:effectLst>
+            <a:outerShdw blurRad="381000" dist="292100" dir="5400000" sx="-80000" sy="-18000" rotWithShape="0">
+              <a:srgbClr val="000000">
+                <a:alpha val="22000"/>
+              </a:srgbClr>
+            </a:outerShdw>
+          </a:effectLst>
+          <a:scene3d>
+            <a:camera prst="orthographicFront"/>
+            <a:lightRig rig="contrasting" dir="t">
+              <a:rot lat="0" lon="0" rev="3000000"/>
+            </a:lightRig>
+          </a:scene3d>
+          <a:sp3d contourW="7620">
+            <a:bevelT w="95250" h="31750"/>
+            <a:contourClr>
+              <a:srgbClr val="333333"/>
+            </a:contourClr>
+          </a:sp3d>
+        </p:spPr>
+      </p:pic>
+      <p:pic>
+        <p:nvPicPr>
+          <p:cNvPr id="6" name="Image 5"/>
+          <p:cNvPicPr>
+            <a:picLocks noChangeAspect="1"/>
+          </p:cNvPicPr>
+          <p:nvPr/>
+        </p:nvPicPr>
+        <p:blipFill>
+          <a:blip r:embed="rId5">
+            <a:extLst>
+              <a:ext uri="{28A0092B-C50C-407E-A947-70E740481C1C}">
+                <a14:useLocalDpi xmlns:a14="http://schemas.microsoft.com/office/drawing/2010/main" val="0"/>
+              </a:ext>
+            </a:extLst>
+          </a:blip>
+          <a:stretch>
+            <a:fillRect/>
+          </a:stretch>
+        </p:blipFill>
+        <p:spPr>
+          <a:xfrm>
+            <a:off x="6417228" y="209725"/>
+            <a:ext cx="5552285" cy="1754522"/>
+          </a:xfrm>
+          <a:prstGeom prst="roundRect">
+            <a:avLst>
+              <a:gd name="adj" fmla="val 4167"/>
+            </a:avLst>
+          </a:prstGeom>
+          <a:solidFill>
+            <a:srgbClr val="FFFFFF"/>
+          </a:solidFill>
+          <a:ln w="76200" cap="sq">
+            <a:solidFill>
+              <a:srgbClr val="EAEAEA"/>
+            </a:solidFill>
+            <a:miter lim="800000"/>
+          </a:ln>
+          <a:effectLst>
+            <a:reflection blurRad="12700" stA="33000" endPos="28000" dist="5000" dir="5400000" sy="-100000" algn="bl" rotWithShape="0"/>
+          </a:effectLst>
+          <a:scene3d>
+            <a:camera prst="orthographicFront"/>
+            <a:lightRig rig="threePt" dir="t">
+              <a:rot lat="0" lon="0" rev="2700000"/>
+            </a:lightRig>
+          </a:scene3d>
+          <a:sp3d contourW="6350">
+            <a:bevelT h="38100"/>
+            <a:contourClr>
+              <a:srgbClr val="C0C0C0"/>
+            </a:contourClr>
+          </a:sp3d>
+        </p:spPr>
+      </p:pic>
     </p:spTree>
     <p:extLst>
       <p:ext uri="{BB962C8B-B14F-4D97-AF65-F5344CB8AC3E}">
@@ -7214,6 +9244,94 @@
           </a:p>
         </p:txBody>
       </p:sp>
+      <p:pic>
+        <p:nvPicPr>
+          <p:cNvPr id="2" name="Image 1"/>
+          <p:cNvPicPr>
+            <a:picLocks noChangeAspect="1"/>
+          </p:cNvPicPr>
+          <p:nvPr/>
+        </p:nvPicPr>
+        <p:blipFill>
+          <a:blip r:embed="rId2">
+            <a:extLst>
+              <a:ext uri="{28A0092B-C50C-407E-A947-70E740481C1C}">
+                <a14:useLocalDpi xmlns:a14="http://schemas.microsoft.com/office/drawing/2010/main" val="0"/>
+              </a:ext>
+            </a:extLst>
+          </a:blip>
+          <a:stretch>
+            <a:fillRect/>
+          </a:stretch>
+        </p:blipFill>
+        <p:spPr>
+          <a:xfrm>
+            <a:off x="325440" y="1031845"/>
+            <a:ext cx="5639132" cy="2769265"/>
+          </a:xfrm>
+          <a:prstGeom prst="rect">
+            <a:avLst/>
+          </a:prstGeom>
+          <a:ln w="38100" cap="sq">
+            <a:solidFill>
+              <a:srgbClr val="000000"/>
+            </a:solidFill>
+            <a:prstDash val="solid"/>
+            <a:miter lim="800000"/>
+          </a:ln>
+          <a:effectLst>
+            <a:outerShdw blurRad="50800" dist="38100" dir="2700000" algn="tl" rotWithShape="0">
+              <a:srgbClr val="000000">
+                <a:alpha val="43000"/>
+              </a:srgbClr>
+            </a:outerShdw>
+          </a:effectLst>
+        </p:spPr>
+      </p:pic>
+      <p:pic>
+        <p:nvPicPr>
+          <p:cNvPr id="3" name="Image 2"/>
+          <p:cNvPicPr>
+            <a:picLocks noChangeAspect="1"/>
+          </p:cNvPicPr>
+          <p:nvPr/>
+        </p:nvPicPr>
+        <p:blipFill>
+          <a:blip r:embed="rId3">
+            <a:extLst>
+              <a:ext uri="{28A0092B-C50C-407E-A947-70E740481C1C}">
+                <a14:useLocalDpi xmlns:a14="http://schemas.microsoft.com/office/drawing/2010/main" val="0"/>
+              </a:ext>
+            </a:extLst>
+          </a:blip>
+          <a:stretch>
+            <a:fillRect/>
+          </a:stretch>
+        </p:blipFill>
+        <p:spPr>
+          <a:xfrm>
+            <a:off x="6290013" y="3801110"/>
+            <a:ext cx="5639500" cy="2769265"/>
+          </a:xfrm>
+          <a:prstGeom prst="rect">
+            <a:avLst/>
+          </a:prstGeom>
+          <a:ln w="38100" cap="sq">
+            <a:solidFill>
+              <a:srgbClr val="000000"/>
+            </a:solidFill>
+            <a:prstDash val="solid"/>
+            <a:miter lim="800000"/>
+          </a:ln>
+          <a:effectLst>
+            <a:outerShdw blurRad="50800" dist="38100" dir="2700000" algn="tl" rotWithShape="0">
+              <a:srgbClr val="000000">
+                <a:alpha val="43000"/>
+              </a:srgbClr>
+            </a:outerShdw>
+          </a:effectLst>
+        </p:spPr>
+      </p:pic>
     </p:spTree>
     <p:extLst>
       <p:ext uri="{BB962C8B-B14F-4D97-AF65-F5344CB8AC3E}">
@@ -7252,8 +9370,8 @@
         </p:nvSpPr>
         <p:spPr>
           <a:xfrm>
-            <a:off x="0" y="87557"/>
-            <a:ext cx="5186035" cy="707886"/>
+            <a:off x="-41293" y="121741"/>
+            <a:ext cx="5511445" cy="707886"/>
           </a:xfrm>
           <a:prstGeom prst="rect">
             <a:avLst/>
@@ -7288,15 +9406,149 @@
                 </a:effectLst>
                 <a:latin typeface="Bauhaus 93" panose="04030905020B02020C02" pitchFamily="82" charset="0"/>
               </a:rPr>
-              <a:t>Conception - Scénario</a:t>
-            </a:r>
+              <a:t>Conception - Affichage</a:t>
+            </a:r>
+          </a:p>
+        </p:txBody>
+      </p:sp>
+      <p:pic>
+        <p:nvPicPr>
+          <p:cNvPr id="2" name="Image 1"/>
+          <p:cNvPicPr>
+            <a:picLocks noChangeAspect="1"/>
+          </p:cNvPicPr>
+          <p:nvPr/>
+        </p:nvPicPr>
+        <p:blipFill>
+          <a:blip r:embed="rId2">
+            <a:extLst>
+              <a:ext uri="{28A0092B-C50C-407E-A947-70E740481C1C}">
+                <a14:useLocalDpi xmlns:a14="http://schemas.microsoft.com/office/drawing/2010/main" val="0"/>
+              </a:ext>
+            </a:extLst>
+          </a:blip>
+          <a:stretch>
+            <a:fillRect/>
+          </a:stretch>
+        </p:blipFill>
+        <p:spPr>
+          <a:xfrm>
+            <a:off x="325440" y="1031845"/>
+            <a:ext cx="5639132" cy="2769265"/>
+          </a:xfrm>
+          <a:prstGeom prst="rect">
+            <a:avLst/>
+          </a:prstGeom>
+          <a:ln w="38100" cap="sq">
+            <a:solidFill>
+              <a:srgbClr val="000000"/>
+            </a:solidFill>
+            <a:prstDash val="solid"/>
+            <a:miter lim="800000"/>
+          </a:ln>
+          <a:effectLst>
+            <a:outerShdw blurRad="50800" dist="38100" dir="2700000" algn="tl" rotWithShape="0">
+              <a:srgbClr val="000000">
+                <a:alpha val="43000"/>
+              </a:srgbClr>
+            </a:outerShdw>
+          </a:effectLst>
+        </p:spPr>
+      </p:pic>
+      <p:pic>
+        <p:nvPicPr>
+          <p:cNvPr id="3" name="Image 2"/>
+          <p:cNvPicPr>
+            <a:picLocks noChangeAspect="1"/>
+          </p:cNvPicPr>
+          <p:nvPr/>
+        </p:nvPicPr>
+        <p:blipFill>
+          <a:blip r:embed="rId3">
+            <a:extLst>
+              <a:ext uri="{28A0092B-C50C-407E-A947-70E740481C1C}">
+                <a14:useLocalDpi xmlns:a14="http://schemas.microsoft.com/office/drawing/2010/main" val="0"/>
+              </a:ext>
+            </a:extLst>
+          </a:blip>
+          <a:stretch>
+            <a:fillRect/>
+          </a:stretch>
+        </p:blipFill>
+        <p:spPr>
+          <a:xfrm>
+            <a:off x="6290013" y="3801110"/>
+            <a:ext cx="5639500" cy="2769265"/>
+          </a:xfrm>
+          <a:prstGeom prst="rect">
+            <a:avLst/>
+          </a:prstGeom>
+          <a:ln w="38100" cap="sq">
+            <a:solidFill>
+              <a:srgbClr val="000000"/>
+            </a:solidFill>
+            <a:prstDash val="solid"/>
+            <a:miter lim="800000"/>
+          </a:ln>
+          <a:effectLst>
+            <a:outerShdw blurRad="50800" dist="38100" dir="2700000" algn="tl" rotWithShape="0">
+              <a:srgbClr val="000000">
+                <a:alpha val="43000"/>
+              </a:srgbClr>
+            </a:outerShdw>
+          </a:effectLst>
+        </p:spPr>
+      </p:pic>
+      <p:sp>
+        <p:nvSpPr>
+          <p:cNvPr id="5" name="Rectangle : coins arrondis 4"/>
+          <p:cNvSpPr/>
+          <p:nvPr/>
+        </p:nvSpPr>
+        <p:spPr>
+          <a:xfrm>
+            <a:off x="6358855" y="4102217"/>
+            <a:ext cx="2718033" cy="209724"/>
+          </a:xfrm>
+          <a:prstGeom prst="roundRect">
+            <a:avLst/>
+          </a:prstGeom>
+          <a:noFill/>
+          <a:ln w="38100">
+            <a:solidFill>
+              <a:srgbClr val="FF0000"/>
+            </a:solidFill>
+          </a:ln>
+        </p:spPr>
+        <p:style>
+          <a:lnRef idx="2">
+            <a:schemeClr val="accent1">
+              <a:shade val="50000"/>
+            </a:schemeClr>
+          </a:lnRef>
+          <a:fillRef idx="1">
+            <a:schemeClr val="accent1"/>
+          </a:fillRef>
+          <a:effectRef idx="0">
+            <a:schemeClr val="accent1"/>
+          </a:effectRef>
+          <a:fontRef idx="minor">
+            <a:schemeClr val="lt1"/>
+          </a:fontRef>
+        </p:style>
+        <p:txBody>
+          <a:bodyPr rtlCol="0" anchor="ctr"/>
+          <a:lstStyle/>
+          <a:p>
+            <a:pPr algn="ctr"/>
+            <a:endParaRPr lang="fr-FR"/>
           </a:p>
         </p:txBody>
       </p:sp>
     </p:spTree>
     <p:extLst>
       <p:ext uri="{BB962C8B-B14F-4D97-AF65-F5344CB8AC3E}">
-        <p14:creationId xmlns:p14="http://schemas.microsoft.com/office/powerpoint/2010/main" val="2774912678"/>
+        <p14:creationId xmlns:p14="http://schemas.microsoft.com/office/powerpoint/2010/main" val="277386992"/>
       </p:ext>
     </p:extLst>
   </p:cSld>

</xml_diff>

<commit_message>
Diapo generation + amelio
</commit_message>
<xml_diff>
--- a/Documents/Présentation ExtremRoguelike.pptx
+++ b/Documents/Présentation ExtremRoguelike.pptx
@@ -126,7 +126,7 @@
   </p:defaultTextStyle>
   <p:extLst>
     <p:ext uri="{EFAFB233-063F-42B5-8137-9DF3F51BA10A}">
-      <p15:sldGuideLst xmlns:p15="http://schemas.microsoft.com/office/powerpoint/2012/main"/>
+      <p15:sldGuideLst xmlns:p15="http://schemas.microsoft.com/office/powerpoint/2012/main" xmlns=""/>
     </p:ext>
   </p:extLst>
 </p:presentation>
@@ -317,7 +317,7 @@
           <a:p>
             <a:fld id="{CF7E704A-4A5B-4083-AE50-BEC8DD5FB5E2}" type="datetimeFigureOut">
               <a:rPr lang="fr-FR" smtClean="0"/>
-              <a:t>04/01/2017</a:t>
+              <a:t>04/01/17</a:t>
             </a:fld>
             <a:endParaRPr lang="fr-FR"/>
           </a:p>
@@ -359,7 +359,7 @@
           <a:p>
             <a:fld id="{946F9432-B78C-421D-BE75-1C3D4A7629AF}" type="slidenum">
               <a:rPr lang="fr-FR" smtClean="0"/>
-              <a:t>‹N°›</a:t>
+              <a:t>‹#›</a:t>
             </a:fld>
             <a:endParaRPr lang="fr-FR"/>
           </a:p>
@@ -615,7 +615,7 @@
           <a:p>
             <a:fld id="{CF7E704A-4A5B-4083-AE50-BEC8DD5FB5E2}" type="datetimeFigureOut">
               <a:rPr lang="fr-FR" smtClean="0"/>
-              <a:t>04/01/2017</a:t>
+              <a:t>04/01/17</a:t>
             </a:fld>
             <a:endParaRPr lang="fr-FR"/>
           </a:p>
@@ -657,7 +657,7 @@
           <a:p>
             <a:fld id="{946F9432-B78C-421D-BE75-1C3D4A7629AF}" type="slidenum">
               <a:rPr lang="fr-FR" smtClean="0"/>
-              <a:t>‹N°›</a:t>
+              <a:t>‹#›</a:t>
             </a:fld>
             <a:endParaRPr lang="fr-FR"/>
           </a:p>
@@ -807,7 +807,7 @@
           <a:p>
             <a:fld id="{CF7E704A-4A5B-4083-AE50-BEC8DD5FB5E2}" type="datetimeFigureOut">
               <a:rPr lang="fr-FR" smtClean="0"/>
-              <a:t>04/01/2017</a:t>
+              <a:t>04/01/17</a:t>
             </a:fld>
             <a:endParaRPr lang="fr-FR"/>
           </a:p>
@@ -849,7 +849,7 @@
           <a:p>
             <a:fld id="{946F9432-B78C-421D-BE75-1C3D4A7629AF}" type="slidenum">
               <a:rPr lang="fr-FR" smtClean="0"/>
-              <a:t>‹N°›</a:t>
+              <a:t>‹#›</a:t>
             </a:fld>
             <a:endParaRPr lang="fr-FR"/>
           </a:p>
@@ -1068,7 +1068,7 @@
           <a:p>
             <a:fld id="{CF7E704A-4A5B-4083-AE50-BEC8DD5FB5E2}" type="datetimeFigureOut">
               <a:rPr lang="fr-FR" smtClean="0"/>
-              <a:t>04/01/2017</a:t>
+              <a:t>04/01/17</a:t>
             </a:fld>
             <a:endParaRPr lang="fr-FR"/>
           </a:p>
@@ -1110,7 +1110,7 @@
           <a:p>
             <a:fld id="{946F9432-B78C-421D-BE75-1C3D4A7629AF}" type="slidenum">
               <a:rPr lang="fr-FR" smtClean="0"/>
-              <a:t>‹N°›</a:t>
+              <a:t>‹#›</a:t>
             </a:fld>
             <a:endParaRPr lang="fr-FR"/>
           </a:p>
@@ -1492,7 +1492,7 @@
           <a:p>
             <a:fld id="{CF7E704A-4A5B-4083-AE50-BEC8DD5FB5E2}" type="datetimeFigureOut">
               <a:rPr lang="fr-FR" smtClean="0"/>
-              <a:t>04/01/2017</a:t>
+              <a:t>04/01/17</a:t>
             </a:fld>
             <a:endParaRPr lang="fr-FR"/>
           </a:p>
@@ -1534,7 +1534,7 @@
           <a:p>
             <a:fld id="{946F9432-B78C-421D-BE75-1C3D4A7629AF}" type="slidenum">
               <a:rPr lang="fr-FR" smtClean="0"/>
-              <a:t>‹N°›</a:t>
+              <a:t>‹#›</a:t>
             </a:fld>
             <a:endParaRPr lang="fr-FR"/>
           </a:p>
@@ -2029,7 +2029,7 @@
           <a:p>
             <a:fld id="{CF7E704A-4A5B-4083-AE50-BEC8DD5FB5E2}" type="datetimeFigureOut">
               <a:rPr lang="fr-FR" smtClean="0"/>
-              <a:t>04/01/2017</a:t>
+              <a:t>04/01/17</a:t>
             </a:fld>
             <a:endParaRPr lang="fr-FR"/>
           </a:p>
@@ -2071,7 +2071,7 @@
           <a:p>
             <a:fld id="{946F9432-B78C-421D-BE75-1C3D4A7629AF}" type="slidenum">
               <a:rPr lang="fr-FR" smtClean="0"/>
-              <a:t>‹N°›</a:t>
+              <a:t>‹#›</a:t>
             </a:fld>
             <a:endParaRPr lang="fr-FR"/>
           </a:p>
@@ -2893,7 +2893,7 @@
           <a:p>
             <a:fld id="{CF7E704A-4A5B-4083-AE50-BEC8DD5FB5E2}" type="datetimeFigureOut">
               <a:rPr lang="fr-FR" smtClean="0"/>
-              <a:t>04/01/2017</a:t>
+              <a:t>04/01/17</a:t>
             </a:fld>
             <a:endParaRPr lang="fr-FR"/>
           </a:p>
@@ -2935,7 +2935,7 @@
           <a:p>
             <a:fld id="{946F9432-B78C-421D-BE75-1C3D4A7629AF}" type="slidenum">
               <a:rPr lang="fr-FR" smtClean="0"/>
-              <a:t>‹N°›</a:t>
+              <a:t>‹#›</a:t>
             </a:fld>
             <a:endParaRPr lang="fr-FR"/>
           </a:p>
@@ -3063,7 +3063,7 @@
           <a:p>
             <a:fld id="{CF7E704A-4A5B-4083-AE50-BEC8DD5FB5E2}" type="datetimeFigureOut">
               <a:rPr lang="fr-FR" smtClean="0"/>
-              <a:t>04/01/2017</a:t>
+              <a:t>04/01/17</a:t>
             </a:fld>
             <a:endParaRPr lang="fr-FR"/>
           </a:p>
@@ -3105,7 +3105,7 @@
           <a:p>
             <a:fld id="{946F9432-B78C-421D-BE75-1C3D4A7629AF}" type="slidenum">
               <a:rPr lang="fr-FR" smtClean="0"/>
-              <a:t>‹N°›</a:t>
+              <a:t>‹#›</a:t>
             </a:fld>
             <a:endParaRPr lang="fr-FR"/>
           </a:p>
@@ -3247,7 +3247,7 @@
           <a:p>
             <a:fld id="{CF7E704A-4A5B-4083-AE50-BEC8DD5FB5E2}" type="datetimeFigureOut">
               <a:rPr lang="fr-FR" smtClean="0"/>
-              <a:t>04/01/2017</a:t>
+              <a:t>04/01/17</a:t>
             </a:fld>
             <a:endParaRPr lang="fr-FR"/>
           </a:p>
@@ -3289,7 +3289,7 @@
           <a:p>
             <a:fld id="{946F9432-B78C-421D-BE75-1C3D4A7629AF}" type="slidenum">
               <a:rPr lang="fr-FR" smtClean="0"/>
-              <a:t>‹N°›</a:t>
+              <a:t>‹#›</a:t>
             </a:fld>
             <a:endParaRPr lang="fr-FR"/>
           </a:p>
@@ -3417,7 +3417,7 @@
           <a:p>
             <a:fld id="{CF7E704A-4A5B-4083-AE50-BEC8DD5FB5E2}" type="datetimeFigureOut">
               <a:rPr lang="fr-FR" smtClean="0"/>
-              <a:t>04/01/2017</a:t>
+              <a:t>04/01/17</a:t>
             </a:fld>
             <a:endParaRPr lang="fr-FR"/>
           </a:p>
@@ -3459,7 +3459,7 @@
           <a:p>
             <a:fld id="{946F9432-B78C-421D-BE75-1C3D4A7629AF}" type="slidenum">
               <a:rPr lang="fr-FR" smtClean="0"/>
-              <a:t>‹N°›</a:t>
+              <a:t>‹#›</a:t>
             </a:fld>
             <a:endParaRPr lang="fr-FR"/>
           </a:p>
@@ -3661,7 +3661,7 @@
           <a:p>
             <a:fld id="{CF7E704A-4A5B-4083-AE50-BEC8DD5FB5E2}" type="datetimeFigureOut">
               <a:rPr lang="fr-FR" smtClean="0"/>
-              <a:t>04/01/2017</a:t>
+              <a:t>04/01/17</a:t>
             </a:fld>
             <a:endParaRPr lang="fr-FR"/>
           </a:p>
@@ -3703,7 +3703,7 @@
           <a:p>
             <a:fld id="{946F9432-B78C-421D-BE75-1C3D4A7629AF}" type="slidenum">
               <a:rPr lang="fr-FR" smtClean="0"/>
-              <a:t>‹N°›</a:t>
+              <a:t>‹#›</a:t>
             </a:fld>
             <a:endParaRPr lang="fr-FR"/>
           </a:p>
@@ -3897,7 +3897,7 @@
           <a:p>
             <a:fld id="{CF7E704A-4A5B-4083-AE50-BEC8DD5FB5E2}" type="datetimeFigureOut">
               <a:rPr lang="fr-FR" smtClean="0"/>
-              <a:t>04/01/2017</a:t>
+              <a:t>04/01/17</a:t>
             </a:fld>
             <a:endParaRPr lang="fr-FR"/>
           </a:p>
@@ -3939,7 +3939,7 @@
           <a:p>
             <a:fld id="{946F9432-B78C-421D-BE75-1C3D4A7629AF}" type="slidenum">
               <a:rPr lang="fr-FR" smtClean="0"/>
-              <a:t>‹N°›</a:t>
+              <a:t>‹#›</a:t>
             </a:fld>
             <a:endParaRPr lang="fr-FR"/>
           </a:p>
@@ -4363,7 +4363,7 @@
           <a:p>
             <a:fld id="{CF7E704A-4A5B-4083-AE50-BEC8DD5FB5E2}" type="datetimeFigureOut">
               <a:rPr lang="fr-FR" smtClean="0"/>
-              <a:t>04/01/2017</a:t>
+              <a:t>04/01/17</a:t>
             </a:fld>
             <a:endParaRPr lang="fr-FR"/>
           </a:p>
@@ -4405,7 +4405,7 @@
           <a:p>
             <a:fld id="{946F9432-B78C-421D-BE75-1C3D4A7629AF}" type="slidenum">
               <a:rPr lang="fr-FR" smtClean="0"/>
-              <a:t>‹N°›</a:t>
+              <a:t>‹#›</a:t>
             </a:fld>
             <a:endParaRPr lang="fr-FR"/>
           </a:p>
@@ -4481,7 +4481,7 @@
           <a:p>
             <a:fld id="{CF7E704A-4A5B-4083-AE50-BEC8DD5FB5E2}" type="datetimeFigureOut">
               <a:rPr lang="fr-FR" smtClean="0"/>
-              <a:t>04/01/2017</a:t>
+              <a:t>04/01/17</a:t>
             </a:fld>
             <a:endParaRPr lang="fr-FR"/>
           </a:p>
@@ -4523,7 +4523,7 @@
           <a:p>
             <a:fld id="{946F9432-B78C-421D-BE75-1C3D4A7629AF}" type="slidenum">
               <a:rPr lang="fr-FR" smtClean="0"/>
-              <a:t>‹N°›</a:t>
+              <a:t>‹#›</a:t>
             </a:fld>
             <a:endParaRPr lang="fr-FR"/>
           </a:p>
@@ -4576,7 +4576,7 @@
           <a:p>
             <a:fld id="{CF7E704A-4A5B-4083-AE50-BEC8DD5FB5E2}" type="datetimeFigureOut">
               <a:rPr lang="fr-FR" smtClean="0"/>
-              <a:t>04/01/2017</a:t>
+              <a:t>04/01/17</a:t>
             </a:fld>
             <a:endParaRPr lang="fr-FR"/>
           </a:p>
@@ -4618,7 +4618,7 @@
           <a:p>
             <a:fld id="{946F9432-B78C-421D-BE75-1C3D4A7629AF}" type="slidenum">
               <a:rPr lang="fr-FR" smtClean="0"/>
-              <a:t>‹N°›</a:t>
+              <a:t>‹#›</a:t>
             </a:fld>
             <a:endParaRPr lang="fr-FR"/>
           </a:p>
@@ -4831,7 +4831,7 @@
           <a:p>
             <a:fld id="{CF7E704A-4A5B-4083-AE50-BEC8DD5FB5E2}" type="datetimeFigureOut">
               <a:rPr lang="fr-FR" smtClean="0"/>
-              <a:t>04/01/2017</a:t>
+              <a:t>04/01/17</a:t>
             </a:fld>
             <a:endParaRPr lang="fr-FR"/>
           </a:p>
@@ -4873,7 +4873,7 @@
           <a:p>
             <a:fld id="{946F9432-B78C-421D-BE75-1C3D4A7629AF}" type="slidenum">
               <a:rPr lang="fr-FR" smtClean="0"/>
-              <a:t>‹N°›</a:t>
+              <a:t>‹#›</a:t>
             </a:fld>
             <a:endParaRPr lang="fr-FR"/>
           </a:p>
@@ -5131,7 +5131,7 @@
           <a:p>
             <a:fld id="{CF7E704A-4A5B-4083-AE50-BEC8DD5FB5E2}" type="datetimeFigureOut">
               <a:rPr lang="fr-FR" smtClean="0"/>
-              <a:t>04/01/2017</a:t>
+              <a:t>04/01/17</a:t>
             </a:fld>
             <a:endParaRPr lang="fr-FR"/>
           </a:p>
@@ -5173,7 +5173,7 @@
           <a:p>
             <a:fld id="{946F9432-B78C-421D-BE75-1C3D4A7629AF}" type="slidenum">
               <a:rPr lang="fr-FR" smtClean="0"/>
-              <a:t>‹N°›</a:t>
+              <a:t>‹#›</a:t>
             </a:fld>
             <a:endParaRPr lang="fr-FR"/>
           </a:p>
@@ -5365,7 +5365,7 @@
           <a:p>
             <a:fld id="{CF7E704A-4A5B-4083-AE50-BEC8DD5FB5E2}" type="datetimeFigureOut">
               <a:rPr lang="fr-FR" smtClean="0"/>
-              <a:t>04/01/2017</a:t>
+              <a:t>04/01/17</a:t>
             </a:fld>
             <a:endParaRPr lang="fr-FR"/>
           </a:p>
@@ -5457,7 +5457,7 @@
           <a:p>
             <a:fld id="{946F9432-B78C-421D-BE75-1C3D4A7629AF}" type="slidenum">
               <a:rPr lang="fr-FR" smtClean="0"/>
-              <a:t>‹N°›</a:t>
+              <a:t>‹#›</a:t>
             </a:fld>
             <a:endParaRPr lang="fr-FR"/>
           </a:p>
@@ -8453,6 +8453,222 @@
           </a:p>
         </p:txBody>
       </p:sp>
+      <p:pic>
+        <p:nvPicPr>
+          <p:cNvPr id="2" name="Image 1"/>
+          <p:cNvPicPr>
+            <a:picLocks noChangeAspect="1"/>
+          </p:cNvPicPr>
+          <p:nvPr/>
+        </p:nvPicPr>
+        <p:blipFill>
+          <a:blip r:embed="rId2"/>
+          <a:stretch>
+            <a:fillRect/>
+          </a:stretch>
+        </p:blipFill>
+        <p:spPr>
+          <a:xfrm>
+            <a:off x="8354069" y="358949"/>
+            <a:ext cx="3158061" cy="3158061"/>
+          </a:xfrm>
+          <a:prstGeom prst="rect">
+            <a:avLst/>
+          </a:prstGeom>
+        </p:spPr>
+      </p:pic>
+      <p:sp>
+        <p:nvSpPr>
+          <p:cNvPr id="3" name="ZoneTexte 2"/>
+          <p:cNvSpPr txBox="1"/>
+          <p:nvPr/>
+        </p:nvSpPr>
+        <p:spPr>
+          <a:xfrm>
+            <a:off x="8378765" y="3686132"/>
+            <a:ext cx="3133409" cy="461665"/>
+          </a:xfrm>
+          <a:prstGeom prst="rect">
+            <a:avLst/>
+          </a:prstGeom>
+          <a:noFill/>
+        </p:spPr>
+        <p:txBody>
+          <a:bodyPr wrap="square" rtlCol="0">
+            <a:spAutoFit/>
+          </a:bodyPr>
+          <a:lstStyle/>
+          <a:p>
+            <a:pPr algn="ctr"/>
+            <a:r>
+              <a:rPr lang="fr-FR" sz="2400" b="1" dirty="0" smtClean="0">
+                <a:ln w="13462">
+                  <a:solidFill>
+                    <a:schemeClr val="bg1"/>
+                  </a:solidFill>
+                  <a:prstDash val="solid"/>
+                </a:ln>
+                <a:solidFill>
+                  <a:schemeClr val="tx1">
+                    <a:lumMod val="85000"/>
+                    <a:lumOff val="15000"/>
+                  </a:schemeClr>
+                </a:solidFill>
+                <a:effectLst>
+                  <a:outerShdw dist="38100" dir="2700000" algn="bl" rotWithShape="0">
+                    <a:schemeClr val="accent5"/>
+                  </a:outerShdw>
+                </a:effectLst>
+                <a:latin typeface="Bauhaus 93" panose="04030905020B02020C02" pitchFamily="82" charset="0"/>
+              </a:rPr>
+              <a:t>Système de combat</a:t>
+            </a:r>
+            <a:endParaRPr lang="fr-FR" sz="2400" b="1" dirty="0">
+              <a:ln w="13462">
+                <a:solidFill>
+                  <a:schemeClr val="bg1"/>
+                </a:solidFill>
+                <a:prstDash val="solid"/>
+              </a:ln>
+              <a:solidFill>
+                <a:schemeClr val="tx1">
+                  <a:lumMod val="85000"/>
+                  <a:lumOff val="15000"/>
+                </a:schemeClr>
+              </a:solidFill>
+              <a:effectLst>
+                <a:outerShdw dist="38100" dir="2700000" algn="bl" rotWithShape="0">
+                  <a:schemeClr val="accent5"/>
+                </a:outerShdw>
+              </a:effectLst>
+              <a:latin typeface="Bauhaus 93" panose="04030905020B02020C02" pitchFamily="82" charset="0"/>
+            </a:endParaRPr>
+          </a:p>
+        </p:txBody>
+      </p:sp>
+      <p:pic>
+        <p:nvPicPr>
+          <p:cNvPr id="6" name="Image 5" descr="stopwatch-161283_1280.png"/>
+          <p:cNvPicPr>
+            <a:picLocks noChangeAspect="1"/>
+          </p:cNvPicPr>
+          <p:nvPr/>
+        </p:nvPicPr>
+        <p:blipFill>
+          <a:blip r:embed="rId3">
+            <a:extLst>
+              <a:ext uri="{28A0092B-C50C-407E-A947-70E740481C1C}">
+                <a14:useLocalDpi xmlns:a14="http://schemas.microsoft.com/office/drawing/2010/main" val="0"/>
+              </a:ext>
+            </a:extLst>
+          </a:blip>
+          <a:stretch>
+            <a:fillRect/>
+          </a:stretch>
+        </p:blipFill>
+        <p:spPr>
+          <a:xfrm>
+            <a:off x="580491" y="2830175"/>
+            <a:ext cx="2483293" cy="3089033"/>
+          </a:xfrm>
+          <a:prstGeom prst="rect">
+            <a:avLst/>
+          </a:prstGeom>
+        </p:spPr>
+      </p:pic>
+      <p:sp>
+        <p:nvSpPr>
+          <p:cNvPr id="7" name="ZoneTexte 6"/>
+          <p:cNvSpPr txBox="1"/>
+          <p:nvPr/>
+        </p:nvSpPr>
+        <p:spPr>
+          <a:xfrm>
+            <a:off x="262828" y="6102673"/>
+            <a:ext cx="3133409" cy="461665"/>
+          </a:xfrm>
+          <a:prstGeom prst="rect">
+            <a:avLst/>
+          </a:prstGeom>
+          <a:noFill/>
+        </p:spPr>
+        <p:txBody>
+          <a:bodyPr wrap="square" rtlCol="0">
+            <a:spAutoFit/>
+          </a:bodyPr>
+          <a:lstStyle/>
+          <a:p>
+            <a:pPr algn="ctr"/>
+            <a:r>
+              <a:rPr lang="fr-FR" sz="2400" b="1" dirty="0" smtClean="0">
+                <a:ln w="13462">
+                  <a:solidFill>
+                    <a:schemeClr val="bg1"/>
+                  </a:solidFill>
+                  <a:prstDash val="solid"/>
+                </a:ln>
+                <a:solidFill>
+                  <a:schemeClr val="tx1">
+                    <a:lumMod val="85000"/>
+                    <a:lumOff val="15000"/>
+                  </a:schemeClr>
+                </a:solidFill>
+                <a:effectLst>
+                  <a:outerShdw dist="38100" dir="2700000" algn="bl" rotWithShape="0">
+                    <a:schemeClr val="accent5"/>
+                  </a:outerShdw>
+                </a:effectLst>
+                <a:latin typeface="Bauhaus 93" panose="04030905020B02020C02" pitchFamily="82" charset="0"/>
+              </a:rPr>
+              <a:t>Chronomètre</a:t>
+            </a:r>
+            <a:endParaRPr lang="fr-FR" sz="2400" b="1" dirty="0">
+              <a:ln w="13462">
+                <a:solidFill>
+                  <a:schemeClr val="bg1"/>
+                </a:solidFill>
+                <a:prstDash val="solid"/>
+              </a:ln>
+              <a:solidFill>
+                <a:schemeClr val="tx1">
+                  <a:lumMod val="85000"/>
+                  <a:lumOff val="15000"/>
+                </a:schemeClr>
+              </a:solidFill>
+              <a:effectLst>
+                <a:outerShdw dist="38100" dir="2700000" algn="bl" rotWithShape="0">
+                  <a:schemeClr val="accent5"/>
+                </a:outerShdw>
+              </a:effectLst>
+              <a:latin typeface="Bauhaus 93" panose="04030905020B02020C02" pitchFamily="82" charset="0"/>
+            </a:endParaRPr>
+          </a:p>
+        </p:txBody>
+      </p:sp>
+      <p:pic>
+        <p:nvPicPr>
+          <p:cNvPr id="8" name="Image 7"/>
+          <p:cNvPicPr>
+            <a:picLocks noChangeAspect="1"/>
+          </p:cNvPicPr>
+          <p:nvPr/>
+        </p:nvPicPr>
+        <p:blipFill>
+          <a:blip r:embed="rId4"/>
+          <a:stretch>
+            <a:fillRect/>
+          </a:stretch>
+        </p:blipFill>
+        <p:spPr>
+          <a:xfrm>
+            <a:off x="4608382" y="1871935"/>
+            <a:ext cx="2321009" cy="3094679"/>
+          </a:xfrm>
+          <a:prstGeom prst="rect">
+            <a:avLst/>
+          </a:prstGeom>
+        </p:spPr>
+      </p:pic>
     </p:spTree>
     <p:extLst>
       <p:ext uri="{BB962C8B-B14F-4D97-AF65-F5344CB8AC3E}">
@@ -10225,6 +10441,28 @@
           <a:chExt cx="0" cy="0"/>
         </a:xfrm>
       </p:grpSpPr>
+      <p:pic>
+        <p:nvPicPr>
+          <p:cNvPr id="5" name="Image 4"/>
+          <p:cNvPicPr/>
+          <p:nvPr/>
+        </p:nvPicPr>
+        <p:blipFill>
+          <a:blip r:embed="rId2"/>
+          <a:stretch>
+            <a:fillRect/>
+          </a:stretch>
+        </p:blipFill>
+        <p:spPr bwMode="auto">
+          <a:xfrm>
+            <a:off x="7696073" y="704099"/>
+            <a:ext cx="3305370" cy="1849962"/>
+          </a:xfrm>
+          <a:prstGeom prst="rect">
+            <a:avLst/>
+          </a:prstGeom>
+        </p:spPr>
+      </p:pic>
       <p:sp>
         <p:nvSpPr>
           <p:cNvPr id="4" name="Rectangle 3"/>
@@ -10274,6 +10512,279 @@
           </a:p>
         </p:txBody>
       </p:sp>
+      <p:sp>
+        <p:nvSpPr>
+          <p:cNvPr id="2" name="ZoneTexte 1"/>
+          <p:cNvSpPr txBox="1"/>
+          <p:nvPr/>
+        </p:nvSpPr>
+        <p:spPr>
+          <a:xfrm>
+            <a:off x="440722" y="1061602"/>
+            <a:ext cx="10627895" cy="1569660"/>
+          </a:xfrm>
+          <a:prstGeom prst="rect">
+            <a:avLst/>
+          </a:prstGeom>
+          <a:noFill/>
+        </p:spPr>
+        <p:txBody>
+          <a:bodyPr wrap="square" rtlCol="0">
+            <a:spAutoFit/>
+          </a:bodyPr>
+          <a:lstStyle/>
+          <a:p>
+            <a:pPr marL="571500" indent="-571500">
+              <a:buFontTx/>
+              <a:buChar char="-"/>
+            </a:pPr>
+            <a:r>
+              <a:rPr lang="fr-FR" sz="2400" b="1" dirty="0" smtClean="0">
+                <a:ln w="13462">
+                  <a:solidFill>
+                    <a:schemeClr val="bg1"/>
+                  </a:solidFill>
+                  <a:prstDash val="solid"/>
+                </a:ln>
+                <a:solidFill>
+                  <a:schemeClr val="tx1">
+                    <a:lumMod val="85000"/>
+                    <a:lumOff val="15000"/>
+                  </a:schemeClr>
+                </a:solidFill>
+                <a:effectLst>
+                  <a:outerShdw dist="38100" dir="2700000" algn="bl" rotWithShape="0">
+                    <a:schemeClr val="accent5"/>
+                  </a:outerShdw>
+                </a:effectLst>
+                <a:latin typeface="Bauhaus 93" panose="04030905020B02020C02" pitchFamily="82" charset="0"/>
+              </a:rPr>
+              <a:t>Initialisation, structures, constantes</a:t>
+            </a:r>
+            <a:endParaRPr lang="fr-FR" sz="2400" b="1" dirty="0">
+              <a:ln w="13462">
+                <a:solidFill>
+                  <a:schemeClr val="bg1"/>
+                </a:solidFill>
+                <a:prstDash val="solid"/>
+              </a:ln>
+              <a:solidFill>
+                <a:schemeClr val="tx1">
+                  <a:lumMod val="85000"/>
+                  <a:lumOff val="15000"/>
+                </a:schemeClr>
+              </a:solidFill>
+              <a:effectLst>
+                <a:outerShdw dist="38100" dir="2700000" algn="bl" rotWithShape="0">
+                  <a:schemeClr val="accent5"/>
+                </a:outerShdw>
+              </a:effectLst>
+              <a:latin typeface="Bauhaus 93" panose="04030905020B02020C02" pitchFamily="82" charset="0"/>
+            </a:endParaRPr>
+          </a:p>
+          <a:p>
+            <a:pPr marL="571500" indent="-571500">
+              <a:buFontTx/>
+              <a:buChar char="-"/>
+            </a:pPr>
+            <a:r>
+              <a:rPr lang="fr-FR" sz="2400" b="1" dirty="0" smtClean="0">
+                <a:ln w="13462">
+                  <a:solidFill>
+                    <a:schemeClr val="bg1"/>
+                  </a:solidFill>
+                  <a:prstDash val="solid"/>
+                </a:ln>
+                <a:solidFill>
+                  <a:schemeClr val="tx1">
+                    <a:lumMod val="85000"/>
+                    <a:lumOff val="15000"/>
+                  </a:schemeClr>
+                </a:solidFill>
+                <a:effectLst>
+                  <a:outerShdw dist="38100" dir="2700000" algn="bl" rotWithShape="0">
+                    <a:schemeClr val="accent5"/>
+                  </a:outerShdw>
+                </a:effectLst>
+                <a:latin typeface="Bauhaus 93" panose="04030905020B02020C02" pitchFamily="82" charset="0"/>
+              </a:rPr>
+              <a:t>Fichiers et fonctions principales</a:t>
+            </a:r>
+            <a:endParaRPr lang="fr-FR" sz="2400" b="1" dirty="0">
+              <a:ln w="13462">
+                <a:solidFill>
+                  <a:schemeClr val="bg1"/>
+                </a:solidFill>
+                <a:prstDash val="solid"/>
+              </a:ln>
+              <a:solidFill>
+                <a:schemeClr val="tx1">
+                  <a:lumMod val="85000"/>
+                  <a:lumOff val="15000"/>
+                </a:schemeClr>
+              </a:solidFill>
+              <a:effectLst>
+                <a:outerShdw dist="38100" dir="2700000" algn="bl" rotWithShape="0">
+                  <a:schemeClr val="accent5"/>
+                </a:outerShdw>
+              </a:effectLst>
+              <a:latin typeface="Bauhaus 93" panose="04030905020B02020C02" pitchFamily="82" charset="0"/>
+            </a:endParaRPr>
+          </a:p>
+          <a:p>
+            <a:pPr marL="571500" indent="-571500">
+              <a:buFontTx/>
+              <a:buChar char="-"/>
+            </a:pPr>
+            <a:r>
+              <a:rPr lang="fr-FR" sz="2400" b="1" dirty="0" smtClean="0">
+                <a:ln w="13462">
+                  <a:solidFill>
+                    <a:schemeClr val="bg1"/>
+                  </a:solidFill>
+                  <a:prstDash val="solid"/>
+                </a:ln>
+                <a:solidFill>
+                  <a:schemeClr val="tx1">
+                    <a:lumMod val="85000"/>
+                    <a:lumOff val="15000"/>
+                  </a:schemeClr>
+                </a:solidFill>
+                <a:effectLst>
+                  <a:outerShdw dist="38100" dir="2700000" algn="bl" rotWithShape="0">
+                    <a:schemeClr val="accent5"/>
+                  </a:outerShdw>
+                </a:effectLst>
+                <a:latin typeface="Bauhaus 93" panose="04030905020B02020C02" pitchFamily="82" charset="0"/>
+              </a:rPr>
+              <a:t>Tests</a:t>
+            </a:r>
+            <a:endParaRPr lang="fr-FR" sz="2400" b="1" dirty="0">
+              <a:ln w="13462">
+                <a:solidFill>
+                  <a:schemeClr val="bg1"/>
+                </a:solidFill>
+                <a:prstDash val="solid"/>
+              </a:ln>
+              <a:solidFill>
+                <a:schemeClr val="tx1">
+                  <a:lumMod val="85000"/>
+                  <a:lumOff val="15000"/>
+                </a:schemeClr>
+              </a:solidFill>
+              <a:effectLst>
+                <a:outerShdw dist="38100" dir="2700000" algn="bl" rotWithShape="0">
+                  <a:schemeClr val="accent5"/>
+                </a:outerShdw>
+              </a:effectLst>
+              <a:latin typeface="Bauhaus 93" panose="04030905020B02020C02" pitchFamily="82" charset="0"/>
+            </a:endParaRPr>
+          </a:p>
+          <a:p>
+            <a:pPr marL="571500" indent="-571500">
+              <a:buFontTx/>
+              <a:buChar char="-"/>
+            </a:pPr>
+            <a:r>
+              <a:rPr lang="fr-FR" sz="2400" b="1" dirty="0" smtClean="0">
+                <a:ln w="13462">
+                  <a:solidFill>
+                    <a:schemeClr val="bg1"/>
+                  </a:solidFill>
+                  <a:prstDash val="solid"/>
+                </a:ln>
+                <a:solidFill>
+                  <a:schemeClr val="tx1">
+                    <a:lumMod val="85000"/>
+                    <a:lumOff val="15000"/>
+                  </a:schemeClr>
+                </a:solidFill>
+                <a:effectLst>
+                  <a:outerShdw dist="38100" dir="2700000" algn="bl" rotWithShape="0">
+                    <a:schemeClr val="accent5"/>
+                  </a:outerShdw>
+                </a:effectLst>
+                <a:latin typeface="Bauhaus 93" panose="04030905020B02020C02" pitchFamily="82" charset="0"/>
+              </a:rPr>
+              <a:t>Programmation modulaire</a:t>
+            </a:r>
+            <a:endParaRPr lang="fr-FR" sz="2400" b="1" dirty="0">
+              <a:ln w="13462">
+                <a:solidFill>
+                  <a:schemeClr val="bg1"/>
+                </a:solidFill>
+                <a:prstDash val="solid"/>
+              </a:ln>
+              <a:solidFill>
+                <a:schemeClr val="tx1">
+                  <a:lumMod val="85000"/>
+                  <a:lumOff val="15000"/>
+                </a:schemeClr>
+              </a:solidFill>
+              <a:effectLst>
+                <a:outerShdw dist="38100" dir="2700000" algn="bl" rotWithShape="0">
+                  <a:schemeClr val="accent5"/>
+                </a:outerShdw>
+              </a:effectLst>
+              <a:latin typeface="Bauhaus 93" panose="04030905020B02020C02" pitchFamily="82" charset="0"/>
+            </a:endParaRPr>
+          </a:p>
+        </p:txBody>
+      </p:sp>
+      <p:pic>
+        <p:nvPicPr>
+          <p:cNvPr id="6" name="Image 5" descr="Capture d’écran 2017-01-04 à 10.38.45.png"/>
+          <p:cNvPicPr>
+            <a:picLocks noChangeAspect="1"/>
+          </p:cNvPicPr>
+          <p:nvPr/>
+        </p:nvPicPr>
+        <p:blipFill>
+          <a:blip r:embed="rId3">
+            <a:extLst>
+              <a:ext uri="{28A0092B-C50C-407E-A947-70E740481C1C}">
+                <a14:useLocalDpi xmlns:a14="http://schemas.microsoft.com/office/drawing/2010/main" val="0"/>
+              </a:ext>
+            </a:extLst>
+          </a:blip>
+          <a:stretch>
+            <a:fillRect/>
+          </a:stretch>
+        </p:blipFill>
+        <p:spPr>
+          <a:xfrm>
+            <a:off x="794892" y="2926817"/>
+            <a:ext cx="5361534" cy="3565845"/>
+          </a:xfrm>
+          <a:prstGeom prst="rect">
+            <a:avLst/>
+          </a:prstGeom>
+        </p:spPr>
+      </p:pic>
+      <p:pic>
+        <p:nvPicPr>
+          <p:cNvPr id="8" name="Image 7"/>
+          <p:cNvPicPr>
+            <a:picLocks noChangeAspect="1"/>
+          </p:cNvPicPr>
+          <p:nvPr/>
+        </p:nvPicPr>
+        <p:blipFill>
+          <a:blip r:embed="rId4"/>
+          <a:stretch>
+            <a:fillRect/>
+          </a:stretch>
+        </p:blipFill>
+        <p:spPr>
+          <a:xfrm>
+            <a:off x="8247639" y="3481034"/>
+            <a:ext cx="2184400" cy="2451100"/>
+          </a:xfrm>
+          <a:prstGeom prst="rect">
+            <a:avLst/>
+          </a:prstGeom>
+        </p:spPr>
+      </p:pic>
     </p:spTree>
     <p:extLst>
       <p:ext uri="{BB962C8B-B14F-4D97-AF65-F5344CB8AC3E}">
@@ -10710,7 +11221,7 @@
     </a:clrScheme>
     <a:fontScheme name="Ardoise">
       <a:majorFont>
-        <a:latin typeface="Calisto MT" panose="02040603050505030304"/>
+        <a:latin typeface="Calisto MT"/>
         <a:ea typeface=""/>
         <a:cs typeface=""/>
         <a:font script="Jpan" typeface="ＭＳ Ｐゴシック"/>
@@ -10745,7 +11256,7 @@
         <a:font script="Geor" typeface="Sylfaen"/>
       </a:majorFont>
       <a:minorFont>
-        <a:latin typeface="Calisto MT" panose="02040603050505030304"/>
+        <a:latin typeface="Calisto MT"/>
         <a:ea typeface=""/>
         <a:cs typeface=""/>
         <a:font script="Jpan" typeface="ＭＳ Ｐゴシック"/>
@@ -10903,7 +11414,7 @@
   <a:extraClrSchemeLst/>
   <a:extLst>
     <a:ext uri="{05A4C25C-085E-4340-85A3-A5531E510DB2}">
-      <thm15:themeFamily xmlns:thm15="http://schemas.microsoft.com/office/thememl/2012/main" name="Slate" id="{C3F70B94-7CE9-428E-ADC1-3269CC2C3385}" vid="{3F2DE9A5-64E6-437C-A389-CC4477E817E8}"/>
+      <thm15:themeFamily xmlns:thm15="http://schemas.microsoft.com/office/thememl/2012/main" xmlns="" name="Slate" id="{C3F70B94-7CE9-428E-ADC1-3269CC2C3385}" vid="{3F2DE9A5-64E6-437C-A389-CC4477E817E8}"/>
     </a:ext>
   </a:extLst>
 </a:theme>

</xml_diff>